<commit_message>
Agregados iconos: chess y chess.com
</commit_message>
<xml_diff>
--- a/icons.pptx
+++ b/icons.pptx
@@ -5,7 +5,7 @@
     <p:sldMasterId id="2147483648" r:id="rId1"/>
   </p:sldMasterIdLst>
   <p:notesMasterIdLst>
-    <p:notesMasterId r:id="rId12"/>
+    <p:notesMasterId r:id="rId14"/>
   </p:notesMasterIdLst>
   <p:sldIdLst>
     <p:sldId id="256" r:id="rId2"/>
@@ -16,8 +16,10 @@
     <p:sldId id="261" r:id="rId7"/>
     <p:sldId id="262" r:id="rId8"/>
     <p:sldId id="263" r:id="rId9"/>
-    <p:sldId id="264" r:id="rId10"/>
-    <p:sldId id="265" r:id="rId11"/>
+    <p:sldId id="267" r:id="rId10"/>
+    <p:sldId id="266" r:id="rId11"/>
+    <p:sldId id="264" r:id="rId12"/>
+    <p:sldId id="265" r:id="rId13"/>
   </p:sldIdLst>
   <p:sldSz cx="9144000" cy="6858000" type="screen4x3"/>
   <p:notesSz cx="6858000" cy="9144000"/>
@@ -535,6 +537,174 @@
             <a:fld id="{B6901A32-48B7-421F-8324-AC0234E88857}" type="slidenum">
               <a:rPr lang="es-UY" smtClean="0"/>
               <a:t>1</a:t>
+            </a:fld>
+            <a:endParaRPr lang="es-UY"/>
+          </a:p>
+        </p:txBody>
+      </p:sp>
+    </p:spTree>
+    <p:extLst>
+      <p:ext uri="{BB962C8B-B14F-4D97-AF65-F5344CB8AC3E}">
+        <p14:creationId xmlns:p14="http://schemas.microsoft.com/office/powerpoint/2010/main" val="2978505877"/>
+      </p:ext>
+    </p:extLst>
+  </p:cSld>
+  <p:clrMapOvr>
+    <a:masterClrMapping/>
+  </p:clrMapOvr>
+</p:notes>
+</file>
+
+<file path=ppt/notesSlides/notesSlide10.xml><?xml version="1.0" encoding="utf-8"?>
+<p:notes xmlns:a="http://schemas.openxmlformats.org/drawingml/2006/main" xmlns:r="http://schemas.openxmlformats.org/officeDocument/2006/relationships" xmlns:p="http://schemas.openxmlformats.org/presentationml/2006/main">
+  <p:cSld>
+    <p:spTree>
+      <p:nvGrpSpPr>
+        <p:cNvPr id="1" name=""/>
+        <p:cNvGrpSpPr/>
+        <p:nvPr/>
+      </p:nvGrpSpPr>
+      <p:grpSpPr>
+        <a:xfrm>
+          <a:off x="0" y="0"/>
+          <a:ext cx="0" cy="0"/>
+          <a:chOff x="0" y="0"/>
+          <a:chExt cx="0" cy="0"/>
+        </a:xfrm>
+      </p:grpSpPr>
+      <p:sp>
+        <p:nvSpPr>
+          <p:cNvPr id="2" name="1 Marcador de imagen de diapositiva"/>
+          <p:cNvSpPr>
+            <a:spLocks noGrp="1" noRot="1" noChangeAspect="1"/>
+          </p:cNvSpPr>
+          <p:nvPr>
+            <p:ph type="sldImg"/>
+          </p:nvPr>
+        </p:nvSpPr>
+        <p:spPr/>
+      </p:sp>
+      <p:sp>
+        <p:nvSpPr>
+          <p:cNvPr id="3" name="2 Marcador de notas"/>
+          <p:cNvSpPr>
+            <a:spLocks noGrp="1"/>
+          </p:cNvSpPr>
+          <p:nvPr>
+            <p:ph type="body" idx="1"/>
+          </p:nvPr>
+        </p:nvSpPr>
+        <p:spPr/>
+        <p:txBody>
+          <a:bodyPr/>
+          <a:lstStyle/>
+          <a:p>
+            <a:endParaRPr lang="es-UY" dirty="0"/>
+          </a:p>
+        </p:txBody>
+      </p:sp>
+      <p:sp>
+        <p:nvSpPr>
+          <p:cNvPr id="4" name="3 Marcador de número de diapositiva"/>
+          <p:cNvSpPr>
+            <a:spLocks noGrp="1"/>
+          </p:cNvSpPr>
+          <p:nvPr>
+            <p:ph type="sldNum" sz="quarter" idx="10"/>
+          </p:nvPr>
+        </p:nvSpPr>
+        <p:spPr/>
+        <p:txBody>
+          <a:bodyPr/>
+          <a:lstStyle/>
+          <a:p>
+            <a:fld id="{B6901A32-48B7-421F-8324-AC0234E88857}" type="slidenum">
+              <a:rPr lang="es-UY" smtClean="0"/>
+              <a:t>10</a:t>
+            </a:fld>
+            <a:endParaRPr lang="es-UY"/>
+          </a:p>
+        </p:txBody>
+      </p:sp>
+    </p:spTree>
+    <p:extLst>
+      <p:ext uri="{BB962C8B-B14F-4D97-AF65-F5344CB8AC3E}">
+        <p14:creationId xmlns:p14="http://schemas.microsoft.com/office/powerpoint/2010/main" val="2978505877"/>
+      </p:ext>
+    </p:extLst>
+  </p:cSld>
+  <p:clrMapOvr>
+    <a:masterClrMapping/>
+  </p:clrMapOvr>
+</p:notes>
+</file>
+
+<file path=ppt/notesSlides/notesSlide11.xml><?xml version="1.0" encoding="utf-8"?>
+<p:notes xmlns:a="http://schemas.openxmlformats.org/drawingml/2006/main" xmlns:r="http://schemas.openxmlformats.org/officeDocument/2006/relationships" xmlns:p="http://schemas.openxmlformats.org/presentationml/2006/main">
+  <p:cSld>
+    <p:spTree>
+      <p:nvGrpSpPr>
+        <p:cNvPr id="1" name=""/>
+        <p:cNvGrpSpPr/>
+        <p:nvPr/>
+      </p:nvGrpSpPr>
+      <p:grpSpPr>
+        <a:xfrm>
+          <a:off x="0" y="0"/>
+          <a:ext cx="0" cy="0"/>
+          <a:chOff x="0" y="0"/>
+          <a:chExt cx="0" cy="0"/>
+        </a:xfrm>
+      </p:grpSpPr>
+      <p:sp>
+        <p:nvSpPr>
+          <p:cNvPr id="2" name="1 Marcador de imagen de diapositiva"/>
+          <p:cNvSpPr>
+            <a:spLocks noGrp="1" noRot="1" noChangeAspect="1"/>
+          </p:cNvSpPr>
+          <p:nvPr>
+            <p:ph type="sldImg"/>
+          </p:nvPr>
+        </p:nvSpPr>
+        <p:spPr/>
+      </p:sp>
+      <p:sp>
+        <p:nvSpPr>
+          <p:cNvPr id="3" name="2 Marcador de notas"/>
+          <p:cNvSpPr>
+            <a:spLocks noGrp="1"/>
+          </p:cNvSpPr>
+          <p:nvPr>
+            <p:ph type="body" idx="1"/>
+          </p:nvPr>
+        </p:nvSpPr>
+        <p:spPr/>
+        <p:txBody>
+          <a:bodyPr/>
+          <a:lstStyle/>
+          <a:p>
+            <a:endParaRPr lang="es-UY" dirty="0"/>
+          </a:p>
+        </p:txBody>
+      </p:sp>
+      <p:sp>
+        <p:nvSpPr>
+          <p:cNvPr id="4" name="3 Marcador de número de diapositiva"/>
+          <p:cNvSpPr>
+            <a:spLocks noGrp="1"/>
+          </p:cNvSpPr>
+          <p:nvPr>
+            <p:ph type="sldNum" sz="quarter" idx="10"/>
+          </p:nvPr>
+        </p:nvSpPr>
+        <p:spPr/>
+        <p:txBody>
+          <a:bodyPr/>
+          <a:lstStyle/>
+          <a:p>
+            <a:fld id="{B6901A32-48B7-421F-8324-AC0234E88857}" type="slidenum">
+              <a:rPr lang="es-UY" smtClean="0"/>
+              <a:t>11</a:t>
             </a:fld>
             <a:endParaRPr lang="es-UY"/>
           </a:p>
@@ -4336,6 +4506,321 @@
 </file>
 
 <file path=ppt/slides/slide10.xml><?xml version="1.0" encoding="utf-8"?>
+<p:sld xmlns:a="http://schemas.openxmlformats.org/drawingml/2006/main" xmlns:r="http://schemas.openxmlformats.org/officeDocument/2006/relationships" xmlns:p="http://schemas.openxmlformats.org/presentationml/2006/main">
+  <p:cSld>
+    <p:spTree>
+      <p:nvGrpSpPr>
+        <p:cNvPr id="1" name=""/>
+        <p:cNvGrpSpPr/>
+        <p:nvPr/>
+      </p:nvGrpSpPr>
+      <p:grpSpPr>
+        <a:xfrm>
+          <a:off x="0" y="0"/>
+          <a:ext cx="0" cy="0"/>
+          <a:chOff x="0" y="0"/>
+          <a:chExt cx="0" cy="0"/>
+        </a:xfrm>
+      </p:grpSpPr>
+      <p:grpSp>
+        <p:nvGrpSpPr>
+          <p:cNvPr id="2" name="1 Grupo"/>
+          <p:cNvGrpSpPr/>
+          <p:nvPr/>
+        </p:nvGrpSpPr>
+        <p:grpSpPr>
+          <a:xfrm>
+            <a:off x="2195736" y="1125471"/>
+            <a:ext cx="3456384" cy="3456384"/>
+            <a:chOff x="2195736" y="1125471"/>
+            <a:chExt cx="3456384" cy="3456384"/>
+          </a:xfrm>
+        </p:grpSpPr>
+        <p:sp>
+          <p:nvSpPr>
+            <p:cNvPr id="4" name="3 Rectángulo"/>
+            <p:cNvSpPr/>
+            <p:nvPr/>
+          </p:nvSpPr>
+          <p:spPr>
+            <a:xfrm>
+              <a:off x="2195736" y="1125471"/>
+              <a:ext cx="3456384" cy="3456384"/>
+            </a:xfrm>
+            <a:prstGeom prst="rect">
+              <a:avLst/>
+            </a:prstGeom>
+            <a:solidFill>
+              <a:srgbClr val="38383D"/>
+            </a:solidFill>
+            <a:ln>
+              <a:noFill/>
+            </a:ln>
+          </p:spPr>
+          <p:style>
+            <a:lnRef idx="2">
+              <a:schemeClr val="accent1">
+                <a:shade val="50000"/>
+              </a:schemeClr>
+            </a:lnRef>
+            <a:fillRef idx="1">
+              <a:schemeClr val="accent1"/>
+            </a:fillRef>
+            <a:effectRef idx="0">
+              <a:schemeClr val="accent1"/>
+            </a:effectRef>
+            <a:fontRef idx="minor">
+              <a:schemeClr val="lt1"/>
+            </a:fontRef>
+          </p:style>
+          <p:txBody>
+            <a:bodyPr rtlCol="0" anchor="ctr"/>
+            <a:lstStyle/>
+            <a:p>
+              <a:pPr algn="ctr"/>
+              <a:endParaRPr lang="es-UY"/>
+            </a:p>
+          </p:txBody>
+        </p:sp>
+        <p:pic>
+          <p:nvPicPr>
+            <p:cNvPr id="8200" name="Picture 8" descr="https://us.123rf.com/450wm/sonulkaster/sonulkaster1708/sonulkaster170800219/83783486-combinaci%C3%B3n-de-ases-de-juegos-de-casino-para-el-icono-de-vector-de-juego-de-poker-o-solitario.jpg?ver=6"/>
+            <p:cNvPicPr>
+              <a:picLocks noChangeAspect="1" noChangeArrowheads="1"/>
+            </p:cNvPicPr>
+            <p:nvPr/>
+          </p:nvPicPr>
+          <p:blipFill rotWithShape="1">
+            <a:blip r:embed="rId3">
+              <a:extLst>
+                <a:ext uri="{BEBA8EAE-BF5A-486C-A8C5-ECC9F3942E4B}">
+                  <a14:imgProps xmlns:a14="http://schemas.microsoft.com/office/drawing/2010/main">
+                    <a14:imgLayer r:embed="rId4">
+                      <a14:imgEffect>
+                        <a14:backgroundRemoval t="10000" b="90000" l="10000" r="90000"/>
+                      </a14:imgEffect>
+                    </a14:imgLayer>
+                  </a14:imgProps>
+                </a:ext>
+                <a:ext uri="{28A0092B-C50C-407E-A947-70E740481C1C}">
+                  <a14:useLocalDpi xmlns:a14="http://schemas.microsoft.com/office/drawing/2010/main" val="0"/>
+                </a:ext>
+              </a:extLst>
+            </a:blip>
+            <a:srcRect l="17501" t="13466" r="17501" b="13466"/>
+            <a:stretch/>
+          </p:blipFill>
+          <p:spPr bwMode="auto">
+            <a:xfrm>
+              <a:off x="2530929" y="1287718"/>
+              <a:ext cx="2785998" cy="3131890"/>
+            </a:xfrm>
+            <a:prstGeom prst="rect">
+              <a:avLst/>
+            </a:prstGeom>
+            <a:noFill/>
+            <a:extLst>
+              <a:ext uri="{909E8E84-426E-40DD-AFC4-6F175D3DCCD1}">
+                <a14:hiddenFill xmlns:a14="http://schemas.microsoft.com/office/drawing/2010/main">
+                  <a:solidFill>
+                    <a:srgbClr val="FFFFFF"/>
+                  </a:solidFill>
+                </a14:hiddenFill>
+              </a:ext>
+            </a:extLst>
+          </p:spPr>
+        </p:pic>
+      </p:grpSp>
+    </p:spTree>
+    <p:extLst>
+      <p:ext uri="{BB962C8B-B14F-4D97-AF65-F5344CB8AC3E}">
+        <p14:creationId xmlns:p14="http://schemas.microsoft.com/office/powerpoint/2010/main" val="2489351745"/>
+      </p:ext>
+    </p:extLst>
+  </p:cSld>
+  <p:clrMapOvr>
+    <a:masterClrMapping/>
+  </p:clrMapOvr>
+  <p:timing>
+    <p:tnLst>
+      <p:par>
+        <p:cTn id="1" dur="indefinite" restart="never" nodeType="tmRoot"/>
+      </p:par>
+    </p:tnLst>
+  </p:timing>
+</p:sld>
+</file>
+
+<file path=ppt/slides/slide11.xml><?xml version="1.0" encoding="utf-8"?>
+<p:sld xmlns:a="http://schemas.openxmlformats.org/drawingml/2006/main" xmlns:r="http://schemas.openxmlformats.org/officeDocument/2006/relationships" xmlns:p="http://schemas.openxmlformats.org/presentationml/2006/main">
+  <p:cSld>
+    <p:spTree>
+      <p:nvGrpSpPr>
+        <p:cNvPr id="1" name=""/>
+        <p:cNvGrpSpPr/>
+        <p:nvPr/>
+      </p:nvGrpSpPr>
+      <p:grpSpPr>
+        <a:xfrm>
+          <a:off x="0" y="0"/>
+          <a:ext cx="0" cy="0"/>
+          <a:chOff x="0" y="0"/>
+          <a:chExt cx="0" cy="0"/>
+        </a:xfrm>
+      </p:grpSpPr>
+      <p:grpSp>
+        <p:nvGrpSpPr>
+          <p:cNvPr id="2" name="1 Grupo"/>
+          <p:cNvGrpSpPr/>
+          <p:nvPr/>
+        </p:nvGrpSpPr>
+        <p:grpSpPr>
+          <a:xfrm>
+            <a:off x="2195736" y="1125471"/>
+            <a:ext cx="3456384" cy="3456384"/>
+            <a:chOff x="2195736" y="1125471"/>
+            <a:chExt cx="3456384" cy="3456384"/>
+          </a:xfrm>
+        </p:grpSpPr>
+        <p:sp>
+          <p:nvSpPr>
+            <p:cNvPr id="4" name="3 Rectángulo"/>
+            <p:cNvSpPr/>
+            <p:nvPr/>
+          </p:nvSpPr>
+          <p:spPr>
+            <a:xfrm>
+              <a:off x="2195736" y="1125471"/>
+              <a:ext cx="3456384" cy="3456384"/>
+            </a:xfrm>
+            <a:prstGeom prst="rect">
+              <a:avLst/>
+            </a:prstGeom>
+            <a:solidFill>
+              <a:srgbClr val="38383D"/>
+            </a:solidFill>
+            <a:ln>
+              <a:noFill/>
+            </a:ln>
+          </p:spPr>
+          <p:style>
+            <a:lnRef idx="2">
+              <a:schemeClr val="accent1">
+                <a:shade val="50000"/>
+              </a:schemeClr>
+            </a:lnRef>
+            <a:fillRef idx="1">
+              <a:schemeClr val="accent1"/>
+            </a:fillRef>
+            <a:effectRef idx="0">
+              <a:schemeClr val="accent1"/>
+            </a:effectRef>
+            <a:fontRef idx="minor">
+              <a:schemeClr val="lt1"/>
+            </a:fontRef>
+          </p:style>
+          <p:txBody>
+            <a:bodyPr rtlCol="0" anchor="ctr"/>
+            <a:lstStyle/>
+            <a:p>
+              <a:pPr algn="ctr"/>
+              <a:endParaRPr lang="es-UY"/>
+            </a:p>
+          </p:txBody>
+        </p:sp>
+        <p:pic>
+          <p:nvPicPr>
+            <p:cNvPr id="9220" name="Picture 4"/>
+            <p:cNvPicPr>
+              <a:picLocks noChangeAspect="1" noChangeArrowheads="1"/>
+            </p:cNvPicPr>
+            <p:nvPr/>
+          </p:nvPicPr>
+          <p:blipFill rotWithShape="1">
+            <a:blip r:embed="rId3" cstate="print">
+              <a:extLst>
+                <a:ext uri="{BEBA8EAE-BF5A-486C-A8C5-ECC9F3942E4B}">
+                  <a14:imgProps xmlns:a14="http://schemas.microsoft.com/office/drawing/2010/main">
+                    <a14:imgLayer r:embed="rId4">
+                      <a14:imgEffect>
+                        <a14:backgroundRemoval t="11667" b="88056" l="28229" r="71563"/>
+                      </a14:imgEffect>
+                    </a14:imgLayer>
+                  </a14:imgProps>
+                </a:ext>
+                <a:ext uri="{28A0092B-C50C-407E-A947-70E740481C1C}">
+                  <a14:useLocalDpi xmlns:a14="http://schemas.microsoft.com/office/drawing/2010/main" val="0"/>
+                </a:ext>
+              </a:extLst>
+            </a:blip>
+            <a:srcRect l="29054" t="12889" r="28411" b="11859"/>
+            <a:stretch/>
+          </p:blipFill>
+          <p:spPr bwMode="auto">
+            <a:xfrm>
+              <a:off x="2258919" y="1196753"/>
+              <a:ext cx="3330018" cy="3313820"/>
+            </a:xfrm>
+            <a:prstGeom prst="rect">
+              <a:avLst/>
+            </a:prstGeom>
+            <a:noFill/>
+            <a:ln>
+              <a:noFill/>
+            </a:ln>
+            <a:effectLst/>
+            <a:extLst>
+              <a:ext uri="{909E8E84-426E-40DD-AFC4-6F175D3DCCD1}">
+                <a14:hiddenFill xmlns:a14="http://schemas.microsoft.com/office/drawing/2010/main">
+                  <a:solidFill>
+                    <a:schemeClr val="accent1"/>
+                  </a:solidFill>
+                </a14:hiddenFill>
+              </a:ext>
+              <a:ext uri="{91240B29-F687-4F45-9708-019B960494DF}">
+                <a14:hiddenLine xmlns:a14="http://schemas.microsoft.com/office/drawing/2010/main" w="9525">
+                  <a:solidFill>
+                    <a:schemeClr val="tx1"/>
+                  </a:solidFill>
+                  <a:miter lim="800000"/>
+                  <a:headEnd/>
+                  <a:tailEnd/>
+                </a14:hiddenLine>
+              </a:ext>
+              <a:ext uri="{AF507438-7753-43E0-B8FC-AC1667EBCBE1}">
+                <a14:hiddenEffects xmlns:a14="http://schemas.microsoft.com/office/drawing/2010/main">
+                  <a:effectLst>
+                    <a:outerShdw dist="35921" dir="2700000" algn="ctr" rotWithShape="0">
+                      <a:schemeClr val="bg2"/>
+                    </a:outerShdw>
+                  </a:effectLst>
+                </a14:hiddenEffects>
+              </a:ext>
+            </a:extLst>
+          </p:spPr>
+        </p:pic>
+      </p:grpSp>
+    </p:spTree>
+    <p:extLst>
+      <p:ext uri="{BB962C8B-B14F-4D97-AF65-F5344CB8AC3E}">
+        <p14:creationId xmlns:p14="http://schemas.microsoft.com/office/powerpoint/2010/main" val="280964693"/>
+      </p:ext>
+    </p:extLst>
+  </p:cSld>
+  <p:clrMapOvr>
+    <a:masterClrMapping/>
+  </p:clrMapOvr>
+  <p:timing>
+    <p:tnLst>
+      <p:par>
+        <p:cTn id="1" dur="indefinite" restart="never" nodeType="tmRoot"/>
+      </p:par>
+    </p:tnLst>
+  </p:timing>
+</p:sld>
+</file>
+
+<file path=ppt/slides/slide12.xml><?xml version="1.0" encoding="utf-8"?>
 <p:sld xmlns:a="http://schemas.openxmlformats.org/drawingml/2006/main" xmlns:r="http://schemas.openxmlformats.org/officeDocument/2006/relationships" xmlns:p="http://schemas.openxmlformats.org/presentationml/2006/main">
   <p:cSld>
     <p:spTree>
@@ -5468,7 +5953,7 @@
       </p:grpSpPr>
       <p:grpSp>
         <p:nvGrpSpPr>
-          <p:cNvPr id="2" name="1 Grupo"/>
+          <p:cNvPr id="3" name="2 Grupo"/>
           <p:cNvGrpSpPr/>
           <p:nvPr/>
         </p:nvGrpSpPr>
@@ -5528,7 +6013,7 @@
         </p:sp>
         <p:pic>
           <p:nvPicPr>
-            <p:cNvPr id="8200" name="Picture 8" descr="https://us.123rf.com/450wm/sonulkaster/sonulkaster1708/sonulkaster170800219/83783486-combinaci%C3%B3n-de-ases-de-juegos-de-casino-para-el-icono-de-vector-de-juego-de-poker-o-solitario.jpg?ver=6"/>
+            <p:cNvPr id="1027" name="Picture 3" descr="C:\Users\Juan\Downloads\chess-icon-11288.png"/>
             <p:cNvPicPr>
               <a:picLocks noChangeAspect="1" noChangeArrowheads="1"/>
             </p:cNvPicPr>
@@ -5537,27 +6022,18 @@
           <p:blipFill rotWithShape="1">
             <a:blip r:embed="rId3">
               <a:extLst>
-                <a:ext uri="{BEBA8EAE-BF5A-486C-A8C5-ECC9F3942E4B}">
-                  <a14:imgProps xmlns:a14="http://schemas.microsoft.com/office/drawing/2010/main">
-                    <a14:imgLayer r:embed="rId4">
-                      <a14:imgEffect>
-                        <a14:backgroundRemoval t="10000" b="90000" l="10000" r="90000"/>
-                      </a14:imgEffect>
-                    </a14:imgLayer>
-                  </a14:imgProps>
-                </a:ext>
                 <a:ext uri="{28A0092B-C50C-407E-A947-70E740481C1C}">
                   <a14:useLocalDpi xmlns:a14="http://schemas.microsoft.com/office/drawing/2010/main" val="0"/>
                 </a:ext>
               </a:extLst>
             </a:blip>
-            <a:srcRect l="17501" t="13466" r="17501" b="13466"/>
+            <a:srcRect l="5717" t="3941" r="3368" b="5120"/>
             <a:stretch/>
           </p:blipFill>
           <p:spPr bwMode="auto">
             <a:xfrm>
-              <a:off x="2530929" y="1287718"/>
-              <a:ext cx="2785998" cy="3131890"/>
+              <a:off x="2335463" y="1268760"/>
+              <a:ext cx="3176930" cy="3169806"/>
             </a:xfrm>
             <a:prstGeom prst="rect">
               <a:avLst/>
@@ -5674,20 +6150,20 @@
         </p:sp>
         <p:pic>
           <p:nvPicPr>
-            <p:cNvPr id="9220" name="Picture 4"/>
+            <p:cNvPr id="3074" name="Picture 2" descr="https://pbs.twimg.com/profile_images/1206960097412501504/Ic61D7tZ_400x400.jpg"/>
             <p:cNvPicPr>
               <a:picLocks noChangeAspect="1" noChangeArrowheads="1"/>
             </p:cNvPicPr>
             <p:nvPr/>
           </p:nvPicPr>
           <p:blipFill rotWithShape="1">
-            <a:blip r:embed="rId3" cstate="print">
+            <a:blip r:embed="rId3">
               <a:extLst>
                 <a:ext uri="{BEBA8EAE-BF5A-486C-A8C5-ECC9F3942E4B}">
                   <a14:imgProps xmlns:a14="http://schemas.microsoft.com/office/drawing/2010/main">
                     <a14:imgLayer r:embed="rId4">
                       <a14:imgEffect>
-                        <a14:backgroundRemoval t="11667" b="88056" l="28229" r="71563"/>
+                        <a14:backgroundRemoval t="5500" b="92000" l="12750" r="87250"/>
                       </a14:imgEffect>
                     </a14:imgLayer>
                   </a14:imgProps>
@@ -5697,48 +6173,25 @@
                 </a:ext>
               </a:extLst>
             </a:blip>
-            <a:srcRect l="29054" t="12889" r="28411" b="11859"/>
+            <a:srcRect l="19144" t="3800" r="19144" b="7890"/>
             <a:stretch/>
           </p:blipFill>
           <p:spPr bwMode="auto">
             <a:xfrm>
-              <a:off x="2258919" y="1196753"/>
-              <a:ext cx="3330018" cy="3313820"/>
+              <a:off x="2771800" y="1204975"/>
+              <a:ext cx="2304256" cy="3297376"/>
             </a:xfrm>
             <a:prstGeom prst="rect">
               <a:avLst/>
             </a:prstGeom>
             <a:noFill/>
-            <a:ln>
-              <a:noFill/>
-            </a:ln>
-            <a:effectLst/>
             <a:extLst>
               <a:ext uri="{909E8E84-426E-40DD-AFC4-6F175D3DCCD1}">
                 <a14:hiddenFill xmlns:a14="http://schemas.microsoft.com/office/drawing/2010/main">
                   <a:solidFill>
-                    <a:schemeClr val="accent1"/>
+                    <a:srgbClr val="FFFFFF"/>
                   </a:solidFill>
                 </a14:hiddenFill>
-              </a:ext>
-              <a:ext uri="{91240B29-F687-4F45-9708-019B960494DF}">
-                <a14:hiddenLine xmlns:a14="http://schemas.microsoft.com/office/drawing/2010/main" w="9525">
-                  <a:solidFill>
-                    <a:schemeClr val="tx1"/>
-                  </a:solidFill>
-                  <a:miter lim="800000"/>
-                  <a:headEnd/>
-                  <a:tailEnd/>
-                </a14:hiddenLine>
-              </a:ext>
-              <a:ext uri="{AF507438-7753-43E0-B8FC-AC1667EBCBE1}">
-                <a14:hiddenEffects xmlns:a14="http://schemas.microsoft.com/office/drawing/2010/main">
-                  <a:effectLst>
-                    <a:outerShdw dist="35921" dir="2700000" algn="ctr" rotWithShape="0">
-                      <a:schemeClr val="bg2"/>
-                    </a:outerShdw>
-                  </a:effectLst>
-                </a14:hiddenEffects>
               </a:ext>
             </a:extLst>
           </p:spPr>
@@ -5747,7 +6200,7 @@
     </p:spTree>
     <p:extLst>
       <p:ext uri="{BB962C8B-B14F-4D97-AF65-F5344CB8AC3E}">
-        <p14:creationId xmlns:p14="http://schemas.microsoft.com/office/powerpoint/2010/main" val="280964693"/>
+        <p14:creationId xmlns:p14="http://schemas.microsoft.com/office/powerpoint/2010/main" val="689486972"/>
       </p:ext>
     </p:extLst>
   </p:cSld>

</xml_diff>

<commit_message>
Agregados iconos: facebook, instagram y youtube
</commit_message>
<xml_diff>
--- a/icons.pptx
+++ b/icons.pptx
@@ -5,21 +5,24 @@
     <p:sldMasterId id="2147483648" r:id="rId1"/>
   </p:sldMasterIdLst>
   <p:notesMasterIdLst>
-    <p:notesMasterId r:id="rId14"/>
+    <p:notesMasterId r:id="rId17"/>
   </p:notesMasterIdLst>
   <p:sldIdLst>
-    <p:sldId id="256" r:id="rId2"/>
-    <p:sldId id="257" r:id="rId3"/>
-    <p:sldId id="258" r:id="rId4"/>
-    <p:sldId id="259" r:id="rId5"/>
-    <p:sldId id="260" r:id="rId6"/>
-    <p:sldId id="261" r:id="rId7"/>
-    <p:sldId id="262" r:id="rId8"/>
-    <p:sldId id="263" r:id="rId9"/>
-    <p:sldId id="267" r:id="rId10"/>
-    <p:sldId id="266" r:id="rId11"/>
-    <p:sldId id="264" r:id="rId12"/>
-    <p:sldId id="265" r:id="rId13"/>
+    <p:sldId id="263" r:id="rId2"/>
+    <p:sldId id="267" r:id="rId3"/>
+    <p:sldId id="256" r:id="rId4"/>
+    <p:sldId id="264" r:id="rId5"/>
+    <p:sldId id="257" r:id="rId6"/>
+    <p:sldId id="269" r:id="rId7"/>
+    <p:sldId id="258" r:id="rId8"/>
+    <p:sldId id="271" r:id="rId9"/>
+    <p:sldId id="266" r:id="rId10"/>
+    <p:sldId id="261" r:id="rId11"/>
+    <p:sldId id="262" r:id="rId12"/>
+    <p:sldId id="270" r:id="rId13"/>
+    <p:sldId id="259" r:id="rId14"/>
+    <p:sldId id="260" r:id="rId15"/>
+    <p:sldId id="265" r:id="rId16"/>
   </p:sldIdLst>
   <p:sldSz cx="9144000" cy="6858000" type="screen4x3"/>
   <p:notesSz cx="6858000" cy="9144000"/>
@@ -705,6 +708,258 @@
             <a:fld id="{B6901A32-48B7-421F-8324-AC0234E88857}" type="slidenum">
               <a:rPr lang="es-UY" smtClean="0"/>
               <a:t>11</a:t>
+            </a:fld>
+            <a:endParaRPr lang="es-UY"/>
+          </a:p>
+        </p:txBody>
+      </p:sp>
+    </p:spTree>
+    <p:extLst>
+      <p:ext uri="{BB962C8B-B14F-4D97-AF65-F5344CB8AC3E}">
+        <p14:creationId xmlns:p14="http://schemas.microsoft.com/office/powerpoint/2010/main" val="2978505877"/>
+      </p:ext>
+    </p:extLst>
+  </p:cSld>
+  <p:clrMapOvr>
+    <a:masterClrMapping/>
+  </p:clrMapOvr>
+</p:notes>
+</file>
+
+<file path=ppt/notesSlides/notesSlide12.xml><?xml version="1.0" encoding="utf-8"?>
+<p:notes xmlns:a="http://schemas.openxmlformats.org/drawingml/2006/main" xmlns:r="http://schemas.openxmlformats.org/officeDocument/2006/relationships" xmlns:p="http://schemas.openxmlformats.org/presentationml/2006/main">
+  <p:cSld>
+    <p:spTree>
+      <p:nvGrpSpPr>
+        <p:cNvPr id="1" name=""/>
+        <p:cNvGrpSpPr/>
+        <p:nvPr/>
+      </p:nvGrpSpPr>
+      <p:grpSpPr>
+        <a:xfrm>
+          <a:off x="0" y="0"/>
+          <a:ext cx="0" cy="0"/>
+          <a:chOff x="0" y="0"/>
+          <a:chExt cx="0" cy="0"/>
+        </a:xfrm>
+      </p:grpSpPr>
+      <p:sp>
+        <p:nvSpPr>
+          <p:cNvPr id="2" name="1 Marcador de imagen de diapositiva"/>
+          <p:cNvSpPr>
+            <a:spLocks noGrp="1" noRot="1" noChangeAspect="1"/>
+          </p:cNvSpPr>
+          <p:nvPr>
+            <p:ph type="sldImg"/>
+          </p:nvPr>
+        </p:nvSpPr>
+        <p:spPr/>
+      </p:sp>
+      <p:sp>
+        <p:nvSpPr>
+          <p:cNvPr id="3" name="2 Marcador de notas"/>
+          <p:cNvSpPr>
+            <a:spLocks noGrp="1"/>
+          </p:cNvSpPr>
+          <p:nvPr>
+            <p:ph type="body" idx="1"/>
+          </p:nvPr>
+        </p:nvSpPr>
+        <p:spPr/>
+        <p:txBody>
+          <a:bodyPr/>
+          <a:lstStyle/>
+          <a:p>
+            <a:endParaRPr lang="es-UY" dirty="0"/>
+          </a:p>
+        </p:txBody>
+      </p:sp>
+      <p:sp>
+        <p:nvSpPr>
+          <p:cNvPr id="4" name="3 Marcador de número de diapositiva"/>
+          <p:cNvSpPr>
+            <a:spLocks noGrp="1"/>
+          </p:cNvSpPr>
+          <p:nvPr>
+            <p:ph type="sldNum" sz="quarter" idx="10"/>
+          </p:nvPr>
+        </p:nvSpPr>
+        <p:spPr/>
+        <p:txBody>
+          <a:bodyPr/>
+          <a:lstStyle/>
+          <a:p>
+            <a:fld id="{B6901A32-48B7-421F-8324-AC0234E88857}" type="slidenum">
+              <a:rPr lang="es-UY" smtClean="0"/>
+              <a:t>12</a:t>
+            </a:fld>
+            <a:endParaRPr lang="es-UY"/>
+          </a:p>
+        </p:txBody>
+      </p:sp>
+    </p:spTree>
+    <p:extLst>
+      <p:ext uri="{BB962C8B-B14F-4D97-AF65-F5344CB8AC3E}">
+        <p14:creationId xmlns:p14="http://schemas.microsoft.com/office/powerpoint/2010/main" val="2978505877"/>
+      </p:ext>
+    </p:extLst>
+  </p:cSld>
+  <p:clrMapOvr>
+    <a:masterClrMapping/>
+  </p:clrMapOvr>
+</p:notes>
+</file>
+
+<file path=ppt/notesSlides/notesSlide13.xml><?xml version="1.0" encoding="utf-8"?>
+<p:notes xmlns:a="http://schemas.openxmlformats.org/drawingml/2006/main" xmlns:r="http://schemas.openxmlformats.org/officeDocument/2006/relationships" xmlns:p="http://schemas.openxmlformats.org/presentationml/2006/main">
+  <p:cSld>
+    <p:spTree>
+      <p:nvGrpSpPr>
+        <p:cNvPr id="1" name=""/>
+        <p:cNvGrpSpPr/>
+        <p:nvPr/>
+      </p:nvGrpSpPr>
+      <p:grpSpPr>
+        <a:xfrm>
+          <a:off x="0" y="0"/>
+          <a:ext cx="0" cy="0"/>
+          <a:chOff x="0" y="0"/>
+          <a:chExt cx="0" cy="0"/>
+        </a:xfrm>
+      </p:grpSpPr>
+      <p:sp>
+        <p:nvSpPr>
+          <p:cNvPr id="2" name="1 Marcador de imagen de diapositiva"/>
+          <p:cNvSpPr>
+            <a:spLocks noGrp="1" noRot="1" noChangeAspect="1"/>
+          </p:cNvSpPr>
+          <p:nvPr>
+            <p:ph type="sldImg"/>
+          </p:nvPr>
+        </p:nvSpPr>
+        <p:spPr/>
+      </p:sp>
+      <p:sp>
+        <p:nvSpPr>
+          <p:cNvPr id="3" name="2 Marcador de notas"/>
+          <p:cNvSpPr>
+            <a:spLocks noGrp="1"/>
+          </p:cNvSpPr>
+          <p:nvPr>
+            <p:ph type="body" idx="1"/>
+          </p:nvPr>
+        </p:nvSpPr>
+        <p:spPr/>
+        <p:txBody>
+          <a:bodyPr/>
+          <a:lstStyle/>
+          <a:p>
+            <a:endParaRPr lang="es-UY" dirty="0"/>
+          </a:p>
+        </p:txBody>
+      </p:sp>
+      <p:sp>
+        <p:nvSpPr>
+          <p:cNvPr id="4" name="3 Marcador de número de diapositiva"/>
+          <p:cNvSpPr>
+            <a:spLocks noGrp="1"/>
+          </p:cNvSpPr>
+          <p:nvPr>
+            <p:ph type="sldNum" sz="quarter" idx="10"/>
+          </p:nvPr>
+        </p:nvSpPr>
+        <p:spPr/>
+        <p:txBody>
+          <a:bodyPr/>
+          <a:lstStyle/>
+          <a:p>
+            <a:fld id="{B6901A32-48B7-421F-8324-AC0234E88857}" type="slidenum">
+              <a:rPr lang="es-UY" smtClean="0"/>
+              <a:t>13</a:t>
+            </a:fld>
+            <a:endParaRPr lang="es-UY"/>
+          </a:p>
+        </p:txBody>
+      </p:sp>
+    </p:spTree>
+    <p:extLst>
+      <p:ext uri="{BB962C8B-B14F-4D97-AF65-F5344CB8AC3E}">
+        <p14:creationId xmlns:p14="http://schemas.microsoft.com/office/powerpoint/2010/main" val="2978505877"/>
+      </p:ext>
+    </p:extLst>
+  </p:cSld>
+  <p:clrMapOvr>
+    <a:masterClrMapping/>
+  </p:clrMapOvr>
+</p:notes>
+</file>
+
+<file path=ppt/notesSlides/notesSlide14.xml><?xml version="1.0" encoding="utf-8"?>
+<p:notes xmlns:a="http://schemas.openxmlformats.org/drawingml/2006/main" xmlns:r="http://schemas.openxmlformats.org/officeDocument/2006/relationships" xmlns:p="http://schemas.openxmlformats.org/presentationml/2006/main">
+  <p:cSld>
+    <p:spTree>
+      <p:nvGrpSpPr>
+        <p:cNvPr id="1" name=""/>
+        <p:cNvGrpSpPr/>
+        <p:nvPr/>
+      </p:nvGrpSpPr>
+      <p:grpSpPr>
+        <a:xfrm>
+          <a:off x="0" y="0"/>
+          <a:ext cx="0" cy="0"/>
+          <a:chOff x="0" y="0"/>
+          <a:chExt cx="0" cy="0"/>
+        </a:xfrm>
+      </p:grpSpPr>
+      <p:sp>
+        <p:nvSpPr>
+          <p:cNvPr id="2" name="1 Marcador de imagen de diapositiva"/>
+          <p:cNvSpPr>
+            <a:spLocks noGrp="1" noRot="1" noChangeAspect="1"/>
+          </p:cNvSpPr>
+          <p:nvPr>
+            <p:ph type="sldImg"/>
+          </p:nvPr>
+        </p:nvSpPr>
+        <p:spPr/>
+      </p:sp>
+      <p:sp>
+        <p:nvSpPr>
+          <p:cNvPr id="3" name="2 Marcador de notas"/>
+          <p:cNvSpPr>
+            <a:spLocks noGrp="1"/>
+          </p:cNvSpPr>
+          <p:nvPr>
+            <p:ph type="body" idx="1"/>
+          </p:nvPr>
+        </p:nvSpPr>
+        <p:spPr/>
+        <p:txBody>
+          <a:bodyPr/>
+          <a:lstStyle/>
+          <a:p>
+            <a:endParaRPr lang="es-UY" dirty="0"/>
+          </a:p>
+        </p:txBody>
+      </p:sp>
+      <p:sp>
+        <p:nvSpPr>
+          <p:cNvPr id="4" name="3 Marcador de número de diapositiva"/>
+          <p:cNvSpPr>
+            <a:spLocks noGrp="1"/>
+          </p:cNvSpPr>
+          <p:nvPr>
+            <p:ph type="sldNum" sz="quarter" idx="10"/>
+          </p:nvPr>
+        </p:nvSpPr>
+        <p:spPr/>
+        <p:txBody>
+          <a:bodyPr/>
+          <a:lstStyle/>
+          <a:p>
+            <a:fld id="{B6901A32-48B7-421F-8324-AC0234E88857}" type="slidenum">
+              <a:rPr lang="es-UY" smtClean="0"/>
+              <a:t>14</a:t>
             </a:fld>
             <a:endParaRPr lang="es-UY"/>
           </a:p>
@@ -4385,15 +4640,15 @@
       </p:grpSpPr>
       <p:grpSp>
         <p:nvGrpSpPr>
-          <p:cNvPr id="5" name="4 Grupo"/>
+          <p:cNvPr id="3" name="2 Grupo"/>
           <p:cNvGrpSpPr/>
           <p:nvPr/>
         </p:nvGrpSpPr>
         <p:grpSpPr>
           <a:xfrm>
-            <a:off x="2195736" y="1124744"/>
+            <a:off x="2195736" y="1125471"/>
             <a:ext cx="3456384" cy="3456384"/>
-            <a:chOff x="2195736" y="1124744"/>
+            <a:chOff x="2195736" y="1125471"/>
             <a:chExt cx="3456384" cy="3456384"/>
           </a:xfrm>
         </p:grpSpPr>
@@ -4405,7 +4660,7 @@
           </p:nvSpPr>
           <p:spPr>
             <a:xfrm>
-              <a:off x="2195736" y="1124744"/>
+              <a:off x="2195736" y="1125471"/>
               <a:ext cx="3456384" cy="3456384"/>
             </a:xfrm>
             <a:prstGeom prst="rect">
@@ -4445,13 +4700,13 @@
         </p:sp>
         <p:pic>
           <p:nvPicPr>
-            <p:cNvPr id="1028" name="Picture 4" descr="C:\Users\Juan\Desktop\google.png"/>
+            <p:cNvPr id="1027" name="Picture 3" descr="C:\Users\Juan\Downloads\chess-icon-11288.png"/>
             <p:cNvPicPr>
               <a:picLocks noChangeAspect="1" noChangeArrowheads="1"/>
             </p:cNvPicPr>
             <p:nvPr/>
           </p:nvPicPr>
-          <p:blipFill>
+          <p:blipFill rotWithShape="1">
             <a:blip r:embed="rId3">
               <a:extLst>
                 <a:ext uri="{28A0092B-C50C-407E-A947-70E740481C1C}">
@@ -4459,15 +4714,13 @@
                 </a:ext>
               </a:extLst>
             </a:blip>
-            <a:srcRect/>
-            <a:stretch>
-              <a:fillRect/>
-            </a:stretch>
+            <a:srcRect l="5717" t="3941" r="3368" b="5120"/>
+            <a:stretch/>
           </p:blipFill>
           <p:spPr bwMode="auto">
             <a:xfrm>
-              <a:off x="2339752" y="1268760"/>
-              <a:ext cx="3168350" cy="3168352"/>
+              <a:off x="2335463" y="1268760"/>
+              <a:ext cx="3176930" cy="3169806"/>
             </a:xfrm>
             <a:prstGeom prst="rect">
               <a:avLst/>
@@ -4488,7 +4741,7 @@
     </p:spTree>
     <p:extLst>
       <p:ext uri="{BB962C8B-B14F-4D97-AF65-F5344CB8AC3E}">
-        <p14:creationId xmlns:p14="http://schemas.microsoft.com/office/powerpoint/2010/main" val="666511151"/>
+        <p14:creationId xmlns:p14="http://schemas.microsoft.com/office/powerpoint/2010/main" val="1533916593"/>
       </p:ext>
     </p:extLst>
   </p:cSld>
@@ -4584,36 +4837,29 @@
         </p:sp>
         <p:pic>
           <p:nvPicPr>
-            <p:cNvPr id="8200" name="Picture 8" descr="https://us.123rf.com/450wm/sonulkaster/sonulkaster1708/sonulkaster170800219/83783486-combinaci%C3%B3n-de-ases-de-juegos-de-casino-para-el-icono-de-vector-de-juego-de-poker-o-solitario.jpg?ver=6"/>
+            <p:cNvPr id="6146" name="Picture 2" descr="https://cdn3.iconfinder.com/data/icons/popular-services-brands-vol-2/512/telegram-512.png"/>
             <p:cNvPicPr>
               <a:picLocks noChangeAspect="1" noChangeArrowheads="1"/>
             </p:cNvPicPr>
             <p:nvPr/>
           </p:nvPicPr>
-          <p:blipFill rotWithShape="1">
+          <p:blipFill>
             <a:blip r:embed="rId3">
               <a:extLst>
-                <a:ext uri="{BEBA8EAE-BF5A-486C-A8C5-ECC9F3942E4B}">
-                  <a14:imgProps xmlns:a14="http://schemas.microsoft.com/office/drawing/2010/main">
-                    <a14:imgLayer r:embed="rId4">
-                      <a14:imgEffect>
-                        <a14:backgroundRemoval t="10000" b="90000" l="10000" r="90000"/>
-                      </a14:imgEffect>
-                    </a14:imgLayer>
-                  </a14:imgProps>
-                </a:ext>
                 <a:ext uri="{28A0092B-C50C-407E-A947-70E740481C1C}">
                   <a14:useLocalDpi xmlns:a14="http://schemas.microsoft.com/office/drawing/2010/main" val="0"/>
                 </a:ext>
               </a:extLst>
             </a:blip>
-            <a:srcRect l="17501" t="13466" r="17501" b="13466"/>
-            <a:stretch/>
+            <a:srcRect/>
+            <a:stretch>
+              <a:fillRect/>
+            </a:stretch>
           </p:blipFill>
           <p:spPr bwMode="auto">
             <a:xfrm>
-              <a:off x="2530929" y="1287718"/>
-              <a:ext cx="2785998" cy="3131890"/>
+              <a:off x="2339026" y="1268760"/>
+              <a:ext cx="3169804" cy="3169806"/>
             </a:xfrm>
             <a:prstGeom prst="rect">
               <a:avLst/>
@@ -4634,7 +4880,7 @@
     </p:spTree>
     <p:extLst>
       <p:ext uri="{BB962C8B-B14F-4D97-AF65-F5344CB8AC3E}">
-        <p14:creationId xmlns:p14="http://schemas.microsoft.com/office/powerpoint/2010/main" val="2489351745"/>
+        <p14:creationId xmlns:p14="http://schemas.microsoft.com/office/powerpoint/2010/main" val="2680816217"/>
       </p:ext>
     </p:extLst>
   </p:cSld>
@@ -4730,71 +4976,39 @@
         </p:sp>
         <p:pic>
           <p:nvPicPr>
-            <p:cNvPr id="9220" name="Picture 4"/>
+            <p:cNvPr id="7170" name="Picture 2" descr="https://ev1.utec.edu.uy/moodle/theme/image.php/klass/theme/1574170910/home/logo"/>
             <p:cNvPicPr>
               <a:picLocks noChangeAspect="1" noChangeArrowheads="1"/>
             </p:cNvPicPr>
             <p:nvPr/>
           </p:nvPicPr>
           <p:blipFill rotWithShape="1">
-            <a:blip r:embed="rId3" cstate="print">
+            <a:blip r:embed="rId3">
               <a:extLst>
-                <a:ext uri="{BEBA8EAE-BF5A-486C-A8C5-ECC9F3942E4B}">
-                  <a14:imgProps xmlns:a14="http://schemas.microsoft.com/office/drawing/2010/main">
-                    <a14:imgLayer r:embed="rId4">
-                      <a14:imgEffect>
-                        <a14:backgroundRemoval t="11667" b="88056" l="28229" r="71563"/>
-                      </a14:imgEffect>
-                    </a14:imgLayer>
-                  </a14:imgProps>
-                </a:ext>
                 <a:ext uri="{28A0092B-C50C-407E-A947-70E740481C1C}">
                   <a14:useLocalDpi xmlns:a14="http://schemas.microsoft.com/office/drawing/2010/main" val="0"/>
                 </a:ext>
               </a:extLst>
             </a:blip>
-            <a:srcRect l="29054" t="12889" r="28411" b="11859"/>
+            <a:srcRect l="-5" r="79355" b="22630"/>
             <a:stretch/>
           </p:blipFill>
           <p:spPr bwMode="auto">
             <a:xfrm>
-              <a:off x="2258919" y="1196753"/>
-              <a:ext cx="3330018" cy="3313820"/>
+              <a:off x="2483768" y="1923829"/>
+              <a:ext cx="3015149" cy="1632906"/>
             </a:xfrm>
             <a:prstGeom prst="rect">
               <a:avLst/>
             </a:prstGeom>
             <a:noFill/>
-            <a:ln>
-              <a:noFill/>
-            </a:ln>
-            <a:effectLst/>
             <a:extLst>
               <a:ext uri="{909E8E84-426E-40DD-AFC4-6F175D3DCCD1}">
                 <a14:hiddenFill xmlns:a14="http://schemas.microsoft.com/office/drawing/2010/main">
                   <a:solidFill>
-                    <a:schemeClr val="accent1"/>
+                    <a:srgbClr val="FFFFFF"/>
                   </a:solidFill>
                 </a14:hiddenFill>
-              </a:ext>
-              <a:ext uri="{91240B29-F687-4F45-9708-019B960494DF}">
-                <a14:hiddenLine xmlns:a14="http://schemas.microsoft.com/office/drawing/2010/main" w="9525">
-                  <a:solidFill>
-                    <a:schemeClr val="tx1"/>
-                  </a:solidFill>
-                  <a:miter lim="800000"/>
-                  <a:headEnd/>
-                  <a:tailEnd/>
-                </a14:hiddenLine>
-              </a:ext>
-              <a:ext uri="{AF507438-7753-43E0-B8FC-AC1667EBCBE1}">
-                <a14:hiddenEffects xmlns:a14="http://schemas.microsoft.com/office/drawing/2010/main">
-                  <a:effectLst>
-                    <a:outerShdw dist="35921" dir="2700000" algn="ctr" rotWithShape="0">
-                      <a:schemeClr val="bg2"/>
-                    </a:outerShdw>
-                  </a:effectLst>
-                </a14:hiddenEffects>
               </a:ext>
             </a:extLst>
           </p:spPr>
@@ -4803,7 +5017,7 @@
     </p:spTree>
     <p:extLst>
       <p:ext uri="{BB962C8B-B14F-4D97-AF65-F5344CB8AC3E}">
-        <p14:creationId xmlns:p14="http://schemas.microsoft.com/office/powerpoint/2010/main" val="280964693"/>
+        <p14:creationId xmlns:p14="http://schemas.microsoft.com/office/powerpoint/2010/main" val="2062562605"/>
       </p:ext>
     </p:extLst>
   </p:cSld>
@@ -4821,6 +5035,469 @@
 </file>
 
 <file path=ppt/slides/slide12.xml><?xml version="1.0" encoding="utf-8"?>
+<p:sld xmlns:a="http://schemas.openxmlformats.org/drawingml/2006/main" xmlns:r="http://schemas.openxmlformats.org/officeDocument/2006/relationships" xmlns:p="http://schemas.openxmlformats.org/presentationml/2006/main">
+  <p:cSld>
+    <p:spTree>
+      <p:nvGrpSpPr>
+        <p:cNvPr id="1" name=""/>
+        <p:cNvGrpSpPr/>
+        <p:nvPr/>
+      </p:nvGrpSpPr>
+      <p:grpSpPr>
+        <a:xfrm>
+          <a:off x="0" y="0"/>
+          <a:ext cx="0" cy="0"/>
+          <a:chOff x="0" y="0"/>
+          <a:chExt cx="0" cy="0"/>
+        </a:xfrm>
+      </p:grpSpPr>
+      <p:grpSp>
+        <p:nvGrpSpPr>
+          <p:cNvPr id="2" name="1 Grupo"/>
+          <p:cNvGrpSpPr/>
+          <p:nvPr/>
+        </p:nvGrpSpPr>
+        <p:grpSpPr>
+          <a:xfrm>
+            <a:off x="2195736" y="1124744"/>
+            <a:ext cx="3456384" cy="3456384"/>
+            <a:chOff x="2195736" y="1124744"/>
+            <a:chExt cx="3456384" cy="3456384"/>
+          </a:xfrm>
+        </p:grpSpPr>
+        <p:sp>
+          <p:nvSpPr>
+            <p:cNvPr id="4" name="3 Rectángulo"/>
+            <p:cNvSpPr/>
+            <p:nvPr/>
+          </p:nvSpPr>
+          <p:spPr>
+            <a:xfrm>
+              <a:off x="2195736" y="1124744"/>
+              <a:ext cx="3456384" cy="3456384"/>
+            </a:xfrm>
+            <a:prstGeom prst="rect">
+              <a:avLst/>
+            </a:prstGeom>
+            <a:solidFill>
+              <a:srgbClr val="38383D"/>
+            </a:solidFill>
+            <a:ln>
+              <a:noFill/>
+            </a:ln>
+          </p:spPr>
+          <p:style>
+            <a:lnRef idx="2">
+              <a:schemeClr val="accent1">
+                <a:shade val="50000"/>
+              </a:schemeClr>
+            </a:lnRef>
+            <a:fillRef idx="1">
+              <a:schemeClr val="accent1"/>
+            </a:fillRef>
+            <a:effectRef idx="0">
+              <a:schemeClr val="accent1"/>
+            </a:effectRef>
+            <a:fontRef idx="minor">
+              <a:schemeClr val="lt1"/>
+            </a:fontRef>
+          </p:style>
+          <p:txBody>
+            <a:bodyPr rtlCol="0" anchor="ctr"/>
+            <a:lstStyle/>
+            <a:p>
+              <a:pPr algn="ctr"/>
+              <a:endParaRPr lang="es-UY"/>
+            </a:p>
+          </p:txBody>
+        </p:sp>
+        <p:pic>
+          <p:nvPicPr>
+            <p:cNvPr id="2050" name="Picture 2" descr="Resultado de imagen para youtube icon"/>
+            <p:cNvPicPr>
+              <a:picLocks noChangeAspect="1" noChangeArrowheads="1"/>
+            </p:cNvPicPr>
+            <p:nvPr/>
+          </p:nvPicPr>
+          <p:blipFill>
+            <a:blip r:embed="rId3" cstate="print">
+              <a:extLst>
+                <a:ext uri="{28A0092B-C50C-407E-A947-70E740481C1C}">
+                  <a14:useLocalDpi xmlns:a14="http://schemas.microsoft.com/office/drawing/2010/main" val="0"/>
+                </a:ext>
+              </a:extLst>
+            </a:blip>
+            <a:srcRect/>
+            <a:stretch>
+              <a:fillRect/>
+            </a:stretch>
+          </p:blipFill>
+          <p:spPr bwMode="auto">
+            <a:xfrm>
+              <a:off x="2289234" y="1700808"/>
+              <a:ext cx="3269388" cy="2304256"/>
+            </a:xfrm>
+            <a:prstGeom prst="rect">
+              <a:avLst/>
+            </a:prstGeom>
+            <a:noFill/>
+            <a:extLst>
+              <a:ext uri="{909E8E84-426E-40DD-AFC4-6F175D3DCCD1}">
+                <a14:hiddenFill xmlns:a14="http://schemas.microsoft.com/office/drawing/2010/main">
+                  <a:solidFill>
+                    <a:srgbClr val="FFFFFF"/>
+                  </a:solidFill>
+                </a14:hiddenFill>
+              </a:ext>
+            </a:extLst>
+          </p:spPr>
+        </p:pic>
+      </p:grpSp>
+    </p:spTree>
+    <p:extLst>
+      <p:ext uri="{BB962C8B-B14F-4D97-AF65-F5344CB8AC3E}">
+        <p14:creationId xmlns:p14="http://schemas.microsoft.com/office/powerpoint/2010/main" val="198720179"/>
+      </p:ext>
+    </p:extLst>
+  </p:cSld>
+  <p:clrMapOvr>
+    <a:masterClrMapping/>
+  </p:clrMapOvr>
+  <p:timing>
+    <p:tnLst>
+      <p:par>
+        <p:cTn id="1" dur="indefinite" restart="never" nodeType="tmRoot"/>
+      </p:par>
+    </p:tnLst>
+  </p:timing>
+</p:sld>
+</file>
+
+<file path=ppt/slides/slide13.xml><?xml version="1.0" encoding="utf-8"?>
+<p:sld xmlns:a="http://schemas.openxmlformats.org/drawingml/2006/main" xmlns:r="http://schemas.openxmlformats.org/officeDocument/2006/relationships" xmlns:p="http://schemas.openxmlformats.org/presentationml/2006/main">
+  <p:cSld>
+    <p:spTree>
+      <p:nvGrpSpPr>
+        <p:cNvPr id="1" name=""/>
+        <p:cNvGrpSpPr/>
+        <p:nvPr/>
+      </p:nvGrpSpPr>
+      <p:grpSpPr>
+        <a:xfrm>
+          <a:off x="0" y="0"/>
+          <a:ext cx="0" cy="0"/>
+          <a:chOff x="0" y="0"/>
+          <a:chExt cx="0" cy="0"/>
+        </a:xfrm>
+      </p:grpSpPr>
+      <p:grpSp>
+        <p:nvGrpSpPr>
+          <p:cNvPr id="2" name="1 Grupo"/>
+          <p:cNvGrpSpPr/>
+          <p:nvPr/>
+        </p:nvGrpSpPr>
+        <p:grpSpPr>
+          <a:xfrm>
+            <a:off x="2195736" y="1125471"/>
+            <a:ext cx="3456384" cy="3456384"/>
+            <a:chOff x="2195736" y="1125471"/>
+            <a:chExt cx="3456384" cy="3456384"/>
+          </a:xfrm>
+        </p:grpSpPr>
+        <p:sp>
+          <p:nvSpPr>
+            <p:cNvPr id="4" name="3 Rectángulo"/>
+            <p:cNvSpPr/>
+            <p:nvPr/>
+          </p:nvSpPr>
+          <p:spPr>
+            <a:xfrm>
+              <a:off x="2195736" y="1125471"/>
+              <a:ext cx="3456384" cy="3456384"/>
+            </a:xfrm>
+            <a:prstGeom prst="rect">
+              <a:avLst/>
+            </a:prstGeom>
+            <a:solidFill>
+              <a:srgbClr val="38383D"/>
+            </a:solidFill>
+            <a:ln>
+              <a:noFill/>
+            </a:ln>
+          </p:spPr>
+          <p:style>
+            <a:lnRef idx="2">
+              <a:schemeClr val="accent1">
+                <a:shade val="50000"/>
+              </a:schemeClr>
+            </a:lnRef>
+            <a:fillRef idx="1">
+              <a:schemeClr val="accent1"/>
+            </a:fillRef>
+            <a:effectRef idx="0">
+              <a:schemeClr val="accent1"/>
+            </a:effectRef>
+            <a:fontRef idx="minor">
+              <a:schemeClr val="lt1"/>
+            </a:fontRef>
+          </p:style>
+          <p:txBody>
+            <a:bodyPr rtlCol="0" anchor="ctr"/>
+            <a:lstStyle/>
+            <a:p>
+              <a:pPr algn="ctr"/>
+              <a:endParaRPr lang="es-UY"/>
+            </a:p>
+          </p:txBody>
+        </p:sp>
+        <p:pic>
+          <p:nvPicPr>
+            <p:cNvPr id="4100" name="Picture 4" descr="https://is3-ssl.mzstatic.com/image/thumb/Purple113/v4/ed/69/8d/ed698d73-6773-80b7-4ad8-b7c4fc17dc95/AppIcon-0-0-1x_U007emarketing-0-0-0-7-0-0-sRGB-0-0-0-GLES2_U002c0-512MB-85-220-0-0.png/400x400.png"/>
+            <p:cNvPicPr>
+              <a:picLocks noChangeAspect="1" noChangeArrowheads="1"/>
+            </p:cNvPicPr>
+            <p:nvPr/>
+          </p:nvPicPr>
+          <p:blipFill rotWithShape="1">
+            <a:blip r:embed="rId3">
+              <a:extLst>
+                <a:ext uri="{BEBA8EAE-BF5A-486C-A8C5-ECC9F3942E4B}">
+                  <a14:imgProps xmlns:a14="http://schemas.microsoft.com/office/drawing/2010/main">
+                    <a14:imgLayer r:embed="rId4">
+                      <a14:imgEffect>
+                        <a14:backgroundRemoval t="10000" b="90000" l="10000" r="90000">
+                          <a14:foregroundMark x1="38000" y1="43250" x2="38000" y2="43250"/>
+                          <a14:foregroundMark x1="49250" y1="50500" x2="49250" y2="50500"/>
+                          <a14:foregroundMark x1="47750" y1="47250" x2="47750" y2="47250"/>
+                          <a14:foregroundMark x1="47750" y1="47250" x2="47750" y2="47250"/>
+                          <a14:foregroundMark x1="41000" y1="31750" x2="41000" y2="31750"/>
+                          <a14:foregroundMark x1="39750" y1="36750" x2="57000" y2="58750"/>
+                          <a14:foregroundMark x1="40750" y1="55750" x2="60750" y2="37750"/>
+                          <a14:foregroundMark x1="42750" y1="50250" x2="55000" y2="43750"/>
+                          <a14:foregroundMark x1="42250" y1="55000" x2="58750" y2="48250"/>
+                          <a14:foregroundMark x1="41500" y1="59500" x2="58500" y2="51000"/>
+                          <a14:foregroundMark x1="51000" y1="34500" x2="51000" y2="23250"/>
+                          <a14:foregroundMark x1="58000" y1="35750" x2="80500" y2="45750"/>
+                          <a14:foregroundMark x1="58250" y1="27250" x2="74750" y2="44250"/>
+                          <a14:foregroundMark x1="71000" y1="42750" x2="65750" y2="65500"/>
+                          <a14:foregroundMark x1="67500" y1="61250" x2="74500" y2="57000"/>
+                          <a14:foregroundMark x1="69500" y1="54000" x2="72750" y2="42500"/>
+                          <a14:foregroundMark x1="71000" y1="59500" x2="71000" y2="44000"/>
+                          <a14:foregroundMark x1="61000" y1="68500" x2="43250" y2="75250"/>
+                          <a14:foregroundMark x1="60000" y1="63250" x2="43000" y2="65750"/>
+                          <a14:foregroundMark x1="42000" y1="70000" x2="24000" y2="67500"/>
+                          <a14:foregroundMark x1="44750" y1="67500" x2="25500" y2="61000"/>
+                          <a14:foregroundMark x1="35000" y1="65000" x2="26750" y2="57500"/>
+                          <a14:foregroundMark x1="37250" y1="59000" x2="25250" y2="50750"/>
+                          <a14:foregroundMark x1="35250" y1="56000" x2="28750" y2="40500"/>
+                          <a14:foregroundMark x1="31750" y1="52000" x2="36000" y2="31250"/>
+                          <a14:foregroundMark x1="34750" y1="45250" x2="45000" y2="25750"/>
+                          <a14:foregroundMark x1="43750" y1="33250" x2="64250" y2="21000"/>
+                          <a14:foregroundMark x1="56250" y1="34250" x2="71250" y2="33750"/>
+                          <a14:foregroundMark x1="60500" y1="34250" x2="73000" y2="42000"/>
+                          <a14:foregroundMark x1="66500" y1="44750" x2="79250" y2="52000"/>
+                          <a14:foregroundMark x1="66250" y1="49500" x2="74000" y2="62000"/>
+                          <a14:foregroundMark x1="65500" y1="56500" x2="65250" y2="67000"/>
+                          <a14:foregroundMark x1="58250" y1="59000" x2="49500" y2="67750"/>
+                          <a14:foregroundMark x1="46750" y1="61500" x2="40750" y2="69500"/>
+                          <a14:foregroundMark x1="39500" y1="64250" x2="29500" y2="69500"/>
+                          <a14:foregroundMark x1="32250" y1="60000" x2="15500" y2="56000"/>
+                          <a14:foregroundMark x1="28250" y1="55750" x2="21500" y2="47500"/>
+                          <a14:foregroundMark x1="31000" y1="51500" x2="23000" y2="40000"/>
+                          <a14:foregroundMark x1="31750" y1="45000" x2="26250" y2="28250"/>
+                          <a14:foregroundMark x1="32000" y1="33250" x2="38000" y2="22250"/>
+                        </a14:backgroundRemoval>
+                      </a14:imgEffect>
+                    </a14:imgLayer>
+                  </a14:imgProps>
+                </a:ext>
+                <a:ext uri="{28A0092B-C50C-407E-A947-70E740481C1C}">
+                  <a14:useLocalDpi xmlns:a14="http://schemas.microsoft.com/office/drawing/2010/main" val="0"/>
+                </a:ext>
+              </a:extLst>
+            </a:blip>
+            <a:srcRect l="8843" t="8843" r="8843" b="8843"/>
+            <a:stretch/>
+          </p:blipFill>
+          <p:spPr bwMode="auto">
+            <a:xfrm>
+              <a:off x="2267017" y="1196752"/>
+              <a:ext cx="3313822" cy="3313822"/>
+            </a:xfrm>
+            <a:prstGeom prst="rect">
+              <a:avLst/>
+            </a:prstGeom>
+            <a:noFill/>
+            <a:extLst>
+              <a:ext uri="{909E8E84-426E-40DD-AFC4-6F175D3DCCD1}">
+                <a14:hiddenFill xmlns:a14="http://schemas.microsoft.com/office/drawing/2010/main">
+                  <a:solidFill>
+                    <a:srgbClr val="FFFFFF"/>
+                  </a:solidFill>
+                </a14:hiddenFill>
+              </a:ext>
+            </a:extLst>
+          </p:spPr>
+        </p:pic>
+      </p:grpSp>
+    </p:spTree>
+    <p:extLst>
+      <p:ext uri="{BB962C8B-B14F-4D97-AF65-F5344CB8AC3E}">
+        <p14:creationId xmlns:p14="http://schemas.microsoft.com/office/powerpoint/2010/main" val="2643687619"/>
+      </p:ext>
+    </p:extLst>
+  </p:cSld>
+  <p:clrMapOvr>
+    <a:masterClrMapping/>
+  </p:clrMapOvr>
+  <p:timing>
+    <p:tnLst>
+      <p:par>
+        <p:cTn id="1" dur="indefinite" restart="never" nodeType="tmRoot"/>
+      </p:par>
+    </p:tnLst>
+  </p:timing>
+</p:sld>
+</file>
+
+<file path=ppt/slides/slide14.xml><?xml version="1.0" encoding="utf-8"?>
+<p:sld xmlns:a="http://schemas.openxmlformats.org/drawingml/2006/main" xmlns:r="http://schemas.openxmlformats.org/officeDocument/2006/relationships" xmlns:p="http://schemas.openxmlformats.org/presentationml/2006/main">
+  <p:cSld>
+    <p:spTree>
+      <p:nvGrpSpPr>
+        <p:cNvPr id="1" name=""/>
+        <p:cNvGrpSpPr/>
+        <p:nvPr/>
+      </p:nvGrpSpPr>
+      <p:grpSpPr>
+        <a:xfrm>
+          <a:off x="0" y="0"/>
+          <a:ext cx="0" cy="0"/>
+          <a:chOff x="0" y="0"/>
+          <a:chExt cx="0" cy="0"/>
+        </a:xfrm>
+      </p:grpSpPr>
+      <p:grpSp>
+        <p:nvGrpSpPr>
+          <p:cNvPr id="2" name="1 Grupo"/>
+          <p:cNvGrpSpPr/>
+          <p:nvPr/>
+        </p:nvGrpSpPr>
+        <p:grpSpPr>
+          <a:xfrm>
+            <a:off x="2195736" y="1125471"/>
+            <a:ext cx="3456384" cy="3456384"/>
+            <a:chOff x="2195736" y="1125471"/>
+            <a:chExt cx="3456384" cy="3456384"/>
+          </a:xfrm>
+        </p:grpSpPr>
+        <p:sp>
+          <p:nvSpPr>
+            <p:cNvPr id="4" name="3 Rectángulo"/>
+            <p:cNvSpPr/>
+            <p:nvPr/>
+          </p:nvSpPr>
+          <p:spPr>
+            <a:xfrm>
+              <a:off x="2195736" y="1125471"/>
+              <a:ext cx="3456384" cy="3456384"/>
+            </a:xfrm>
+            <a:prstGeom prst="rect">
+              <a:avLst/>
+            </a:prstGeom>
+            <a:solidFill>
+              <a:srgbClr val="38383D"/>
+            </a:solidFill>
+            <a:ln>
+              <a:noFill/>
+            </a:ln>
+          </p:spPr>
+          <p:style>
+            <a:lnRef idx="2">
+              <a:schemeClr val="accent1">
+                <a:shade val="50000"/>
+              </a:schemeClr>
+            </a:lnRef>
+            <a:fillRef idx="1">
+              <a:schemeClr val="accent1"/>
+            </a:fillRef>
+            <a:effectRef idx="0">
+              <a:schemeClr val="accent1"/>
+            </a:effectRef>
+            <a:fontRef idx="minor">
+              <a:schemeClr val="lt1"/>
+            </a:fontRef>
+          </p:style>
+          <p:txBody>
+            <a:bodyPr rtlCol="0" anchor="ctr"/>
+            <a:lstStyle/>
+            <a:p>
+              <a:pPr algn="ctr"/>
+              <a:endParaRPr lang="es-UY"/>
+            </a:p>
+          </p:txBody>
+        </p:sp>
+        <p:pic>
+          <p:nvPicPr>
+            <p:cNvPr id="5" name="Picture 2" descr="https://i.pinimg.com/originals/79/dc/31/79dc31280371b8ffbe56ec656418e122.png"/>
+            <p:cNvPicPr>
+              <a:picLocks noChangeAspect="1" noChangeArrowheads="1"/>
+            </p:cNvPicPr>
+            <p:nvPr/>
+          </p:nvPicPr>
+          <p:blipFill rotWithShape="1">
+            <a:blip r:embed="rId3">
+              <a:extLst>
+                <a:ext uri="{28A0092B-C50C-407E-A947-70E740481C1C}">
+                  <a14:useLocalDpi xmlns:a14="http://schemas.microsoft.com/office/drawing/2010/main" val="0"/>
+                </a:ext>
+              </a:extLst>
+            </a:blip>
+            <a:srcRect l="13182" t="13182" r="13182" b="13182"/>
+            <a:stretch/>
+          </p:blipFill>
+          <p:spPr bwMode="auto">
+            <a:xfrm>
+              <a:off x="2195736" y="1125471"/>
+              <a:ext cx="3456384" cy="3456384"/>
+            </a:xfrm>
+            <a:prstGeom prst="rect">
+              <a:avLst/>
+            </a:prstGeom>
+            <a:noFill/>
+            <a:extLst>
+              <a:ext uri="{909E8E84-426E-40DD-AFC4-6F175D3DCCD1}">
+                <a14:hiddenFill xmlns:a14="http://schemas.microsoft.com/office/drawing/2010/main">
+                  <a:solidFill>
+                    <a:srgbClr val="FFFFFF"/>
+                  </a:solidFill>
+                </a14:hiddenFill>
+              </a:ext>
+            </a:extLst>
+          </p:spPr>
+        </p:pic>
+      </p:grpSp>
+    </p:spTree>
+    <p:extLst>
+      <p:ext uri="{BB962C8B-B14F-4D97-AF65-F5344CB8AC3E}">
+        <p14:creationId xmlns:p14="http://schemas.microsoft.com/office/powerpoint/2010/main" val="4240436308"/>
+      </p:ext>
+    </p:extLst>
+  </p:cSld>
+  <p:clrMapOvr>
+    <a:masterClrMapping/>
+  </p:clrMapOvr>
+  <p:timing>
+    <p:tnLst>
+      <p:par>
+        <p:cTn id="1" dur="indefinite" restart="never" nodeType="tmRoot"/>
+      </p:par>
+    </p:tnLst>
+  </p:timing>
+</p:sld>
+</file>
+
+<file path=ppt/slides/slide15.xml><?xml version="1.0" encoding="utf-8"?>
 <p:sld xmlns:a="http://schemas.openxmlformats.org/drawingml/2006/main" xmlns:r="http://schemas.openxmlformats.org/officeDocument/2006/relationships" xmlns:p="http://schemas.openxmlformats.org/presentationml/2006/main">
   <p:cSld>
     <p:spTree>
@@ -5137,6 +5814,458 @@
         </p:sp>
         <p:pic>
           <p:nvPicPr>
+            <p:cNvPr id="3074" name="Picture 2" descr="https://pbs.twimg.com/profile_images/1206960097412501504/Ic61D7tZ_400x400.jpg"/>
+            <p:cNvPicPr>
+              <a:picLocks noChangeAspect="1" noChangeArrowheads="1"/>
+            </p:cNvPicPr>
+            <p:nvPr/>
+          </p:nvPicPr>
+          <p:blipFill rotWithShape="1">
+            <a:blip r:embed="rId3">
+              <a:extLst>
+                <a:ext uri="{BEBA8EAE-BF5A-486C-A8C5-ECC9F3942E4B}">
+                  <a14:imgProps xmlns:a14="http://schemas.microsoft.com/office/drawing/2010/main">
+                    <a14:imgLayer r:embed="rId4">
+                      <a14:imgEffect>
+                        <a14:backgroundRemoval t="5500" b="92000" l="12750" r="87250"/>
+                      </a14:imgEffect>
+                    </a14:imgLayer>
+                  </a14:imgProps>
+                </a:ext>
+                <a:ext uri="{28A0092B-C50C-407E-A947-70E740481C1C}">
+                  <a14:useLocalDpi xmlns:a14="http://schemas.microsoft.com/office/drawing/2010/main" val="0"/>
+                </a:ext>
+              </a:extLst>
+            </a:blip>
+            <a:srcRect l="19144" t="3800" r="19144" b="7890"/>
+            <a:stretch/>
+          </p:blipFill>
+          <p:spPr bwMode="auto">
+            <a:xfrm>
+              <a:off x="2771800" y="1204975"/>
+              <a:ext cx="2304256" cy="3297376"/>
+            </a:xfrm>
+            <a:prstGeom prst="rect">
+              <a:avLst/>
+            </a:prstGeom>
+            <a:noFill/>
+            <a:extLst>
+              <a:ext uri="{909E8E84-426E-40DD-AFC4-6F175D3DCCD1}">
+                <a14:hiddenFill xmlns:a14="http://schemas.microsoft.com/office/drawing/2010/main">
+                  <a:solidFill>
+                    <a:srgbClr val="FFFFFF"/>
+                  </a:solidFill>
+                </a14:hiddenFill>
+              </a:ext>
+            </a:extLst>
+          </p:spPr>
+        </p:pic>
+      </p:grpSp>
+    </p:spTree>
+    <p:extLst>
+      <p:ext uri="{BB962C8B-B14F-4D97-AF65-F5344CB8AC3E}">
+        <p14:creationId xmlns:p14="http://schemas.microsoft.com/office/powerpoint/2010/main" val="689486972"/>
+      </p:ext>
+    </p:extLst>
+  </p:cSld>
+  <p:clrMapOvr>
+    <a:masterClrMapping/>
+  </p:clrMapOvr>
+  <p:timing>
+    <p:tnLst>
+      <p:par>
+        <p:cTn id="1" dur="indefinite" restart="never" nodeType="tmRoot"/>
+      </p:par>
+    </p:tnLst>
+  </p:timing>
+</p:sld>
+</file>
+
+<file path=ppt/slides/slide3.xml><?xml version="1.0" encoding="utf-8"?>
+<p:sld xmlns:a="http://schemas.openxmlformats.org/drawingml/2006/main" xmlns:r="http://schemas.openxmlformats.org/officeDocument/2006/relationships" xmlns:p="http://schemas.openxmlformats.org/presentationml/2006/main">
+  <p:cSld>
+    <p:spTree>
+      <p:nvGrpSpPr>
+        <p:cNvPr id="1" name=""/>
+        <p:cNvGrpSpPr/>
+        <p:nvPr/>
+      </p:nvGrpSpPr>
+      <p:grpSpPr>
+        <a:xfrm>
+          <a:off x="0" y="0"/>
+          <a:ext cx="0" cy="0"/>
+          <a:chOff x="0" y="0"/>
+          <a:chExt cx="0" cy="0"/>
+        </a:xfrm>
+      </p:grpSpPr>
+      <p:grpSp>
+        <p:nvGrpSpPr>
+          <p:cNvPr id="2" name="1 Grupo"/>
+          <p:cNvGrpSpPr/>
+          <p:nvPr/>
+        </p:nvGrpSpPr>
+        <p:grpSpPr>
+          <a:xfrm>
+            <a:off x="2191182" y="1124744"/>
+            <a:ext cx="3465492" cy="3456384"/>
+            <a:chOff x="2191182" y="1124744"/>
+            <a:chExt cx="3465492" cy="3456384"/>
+          </a:xfrm>
+        </p:grpSpPr>
+        <p:sp>
+          <p:nvSpPr>
+            <p:cNvPr id="4" name="3 Rectángulo"/>
+            <p:cNvSpPr/>
+            <p:nvPr/>
+          </p:nvSpPr>
+          <p:spPr>
+            <a:xfrm>
+              <a:off x="2195736" y="1124744"/>
+              <a:ext cx="3456384" cy="3456384"/>
+            </a:xfrm>
+            <a:prstGeom prst="rect">
+              <a:avLst/>
+            </a:prstGeom>
+            <a:solidFill>
+              <a:srgbClr val="38383D"/>
+            </a:solidFill>
+            <a:ln>
+              <a:noFill/>
+            </a:ln>
+          </p:spPr>
+          <p:style>
+            <a:lnRef idx="2">
+              <a:schemeClr val="accent1">
+                <a:shade val="50000"/>
+              </a:schemeClr>
+            </a:lnRef>
+            <a:fillRef idx="1">
+              <a:schemeClr val="accent1"/>
+            </a:fillRef>
+            <a:effectRef idx="0">
+              <a:schemeClr val="accent1"/>
+            </a:effectRef>
+            <a:fontRef idx="minor">
+              <a:schemeClr val="lt1"/>
+            </a:fontRef>
+          </p:style>
+          <p:txBody>
+            <a:bodyPr rtlCol="0" anchor="ctr"/>
+            <a:lstStyle/>
+            <a:p>
+              <a:pPr algn="ctr"/>
+              <a:endParaRPr lang="es-UY"/>
+            </a:p>
+          </p:txBody>
+        </p:sp>
+        <p:pic>
+          <p:nvPicPr>
+            <p:cNvPr id="1026" name="Picture 2" descr="Resultado de imagen para facebook icon"/>
+            <p:cNvPicPr>
+              <a:picLocks noChangeAspect="1" noChangeArrowheads="1"/>
+            </p:cNvPicPr>
+            <p:nvPr/>
+          </p:nvPicPr>
+          <p:blipFill rotWithShape="1">
+            <a:blip r:embed="rId3" cstate="print">
+              <a:extLst>
+                <a:ext uri="{28A0092B-C50C-407E-A947-70E740481C1C}">
+                  <a14:useLocalDpi xmlns:a14="http://schemas.microsoft.com/office/drawing/2010/main" val="0"/>
+                </a:ext>
+              </a:extLst>
+            </a:blip>
+            <a:srcRect l="3373" t="3496" r="3373" b="3496"/>
+            <a:stretch/>
+          </p:blipFill>
+          <p:spPr bwMode="auto">
+            <a:xfrm>
+              <a:off x="2191182" y="1124744"/>
+              <a:ext cx="3465492" cy="3456384"/>
+            </a:xfrm>
+            <a:prstGeom prst="rect">
+              <a:avLst/>
+            </a:prstGeom>
+            <a:noFill/>
+            <a:extLst>
+              <a:ext uri="{909E8E84-426E-40DD-AFC4-6F175D3DCCD1}">
+                <a14:hiddenFill xmlns:a14="http://schemas.microsoft.com/office/drawing/2010/main">
+                  <a:solidFill>
+                    <a:srgbClr val="FFFFFF"/>
+                  </a:solidFill>
+                </a14:hiddenFill>
+              </a:ext>
+            </a:extLst>
+          </p:spPr>
+        </p:pic>
+      </p:grpSp>
+    </p:spTree>
+    <p:extLst>
+      <p:ext uri="{BB962C8B-B14F-4D97-AF65-F5344CB8AC3E}">
+        <p14:creationId xmlns:p14="http://schemas.microsoft.com/office/powerpoint/2010/main" val="666511151"/>
+      </p:ext>
+    </p:extLst>
+  </p:cSld>
+  <p:clrMapOvr>
+    <a:masterClrMapping/>
+  </p:clrMapOvr>
+  <p:timing>
+    <p:tnLst>
+      <p:par>
+        <p:cTn id="1" dur="indefinite" restart="never" nodeType="tmRoot"/>
+      </p:par>
+    </p:tnLst>
+  </p:timing>
+</p:sld>
+</file>
+
+<file path=ppt/slides/slide4.xml><?xml version="1.0" encoding="utf-8"?>
+<p:sld xmlns:a="http://schemas.openxmlformats.org/drawingml/2006/main" xmlns:r="http://schemas.openxmlformats.org/officeDocument/2006/relationships" xmlns:p="http://schemas.openxmlformats.org/presentationml/2006/main">
+  <p:cSld>
+    <p:spTree>
+      <p:nvGrpSpPr>
+        <p:cNvPr id="1" name=""/>
+        <p:cNvGrpSpPr/>
+        <p:nvPr/>
+      </p:nvGrpSpPr>
+      <p:grpSpPr>
+        <a:xfrm>
+          <a:off x="0" y="0"/>
+          <a:ext cx="0" cy="0"/>
+          <a:chOff x="0" y="0"/>
+          <a:chExt cx="0" cy="0"/>
+        </a:xfrm>
+      </p:grpSpPr>
+      <p:grpSp>
+        <p:nvGrpSpPr>
+          <p:cNvPr id="2" name="1 Grupo"/>
+          <p:cNvGrpSpPr/>
+          <p:nvPr/>
+        </p:nvGrpSpPr>
+        <p:grpSpPr>
+          <a:xfrm>
+            <a:off x="2195736" y="1125471"/>
+            <a:ext cx="3456384" cy="3456384"/>
+            <a:chOff x="2195736" y="1125471"/>
+            <a:chExt cx="3456384" cy="3456384"/>
+          </a:xfrm>
+        </p:grpSpPr>
+        <p:sp>
+          <p:nvSpPr>
+            <p:cNvPr id="4" name="3 Rectángulo"/>
+            <p:cNvSpPr/>
+            <p:nvPr/>
+          </p:nvSpPr>
+          <p:spPr>
+            <a:xfrm>
+              <a:off x="2195736" y="1125471"/>
+              <a:ext cx="3456384" cy="3456384"/>
+            </a:xfrm>
+            <a:prstGeom prst="rect">
+              <a:avLst/>
+            </a:prstGeom>
+            <a:solidFill>
+              <a:srgbClr val="38383D"/>
+            </a:solidFill>
+            <a:ln>
+              <a:noFill/>
+            </a:ln>
+          </p:spPr>
+          <p:style>
+            <a:lnRef idx="2">
+              <a:schemeClr val="accent1">
+                <a:shade val="50000"/>
+              </a:schemeClr>
+            </a:lnRef>
+            <a:fillRef idx="1">
+              <a:schemeClr val="accent1"/>
+            </a:fillRef>
+            <a:effectRef idx="0">
+              <a:schemeClr val="accent1"/>
+            </a:effectRef>
+            <a:fontRef idx="minor">
+              <a:schemeClr val="lt1"/>
+            </a:fontRef>
+          </p:style>
+          <p:txBody>
+            <a:bodyPr rtlCol="0" anchor="ctr"/>
+            <a:lstStyle/>
+            <a:p>
+              <a:pPr algn="ctr"/>
+              <a:endParaRPr lang="es-UY"/>
+            </a:p>
+          </p:txBody>
+        </p:sp>
+        <p:pic>
+          <p:nvPicPr>
+            <p:cNvPr id="9220" name="Picture 4"/>
+            <p:cNvPicPr>
+              <a:picLocks noChangeAspect="1" noChangeArrowheads="1"/>
+            </p:cNvPicPr>
+            <p:nvPr/>
+          </p:nvPicPr>
+          <p:blipFill rotWithShape="1">
+            <a:blip r:embed="rId3" cstate="print">
+              <a:extLst>
+                <a:ext uri="{BEBA8EAE-BF5A-486C-A8C5-ECC9F3942E4B}">
+                  <a14:imgProps xmlns:a14="http://schemas.microsoft.com/office/drawing/2010/main">
+                    <a14:imgLayer r:embed="rId4">
+                      <a14:imgEffect>
+                        <a14:backgroundRemoval t="11667" b="88056" l="28229" r="71563"/>
+                      </a14:imgEffect>
+                    </a14:imgLayer>
+                  </a14:imgProps>
+                </a:ext>
+                <a:ext uri="{28A0092B-C50C-407E-A947-70E740481C1C}">
+                  <a14:useLocalDpi xmlns:a14="http://schemas.microsoft.com/office/drawing/2010/main" val="0"/>
+                </a:ext>
+              </a:extLst>
+            </a:blip>
+            <a:srcRect l="29054" t="12889" r="28411" b="11859"/>
+            <a:stretch/>
+          </p:blipFill>
+          <p:spPr bwMode="auto">
+            <a:xfrm>
+              <a:off x="2258919" y="1196753"/>
+              <a:ext cx="3330018" cy="3313820"/>
+            </a:xfrm>
+            <a:prstGeom prst="rect">
+              <a:avLst/>
+            </a:prstGeom>
+            <a:noFill/>
+            <a:ln>
+              <a:noFill/>
+            </a:ln>
+            <a:effectLst/>
+            <a:extLst>
+              <a:ext uri="{909E8E84-426E-40DD-AFC4-6F175D3DCCD1}">
+                <a14:hiddenFill xmlns:a14="http://schemas.microsoft.com/office/drawing/2010/main">
+                  <a:solidFill>
+                    <a:schemeClr val="accent1"/>
+                  </a:solidFill>
+                </a14:hiddenFill>
+              </a:ext>
+              <a:ext uri="{91240B29-F687-4F45-9708-019B960494DF}">
+                <a14:hiddenLine xmlns:a14="http://schemas.microsoft.com/office/drawing/2010/main" w="9525">
+                  <a:solidFill>
+                    <a:schemeClr val="tx1"/>
+                  </a:solidFill>
+                  <a:miter lim="800000"/>
+                  <a:headEnd/>
+                  <a:tailEnd/>
+                </a14:hiddenLine>
+              </a:ext>
+              <a:ext uri="{AF507438-7753-43E0-B8FC-AC1667EBCBE1}">
+                <a14:hiddenEffects xmlns:a14="http://schemas.microsoft.com/office/drawing/2010/main">
+                  <a:effectLst>
+                    <a:outerShdw dist="35921" dir="2700000" algn="ctr" rotWithShape="0">
+                      <a:schemeClr val="bg2"/>
+                    </a:outerShdw>
+                  </a:effectLst>
+                </a14:hiddenEffects>
+              </a:ext>
+            </a:extLst>
+          </p:spPr>
+        </p:pic>
+      </p:grpSp>
+    </p:spTree>
+    <p:extLst>
+      <p:ext uri="{BB962C8B-B14F-4D97-AF65-F5344CB8AC3E}">
+        <p14:creationId xmlns:p14="http://schemas.microsoft.com/office/powerpoint/2010/main" val="280964693"/>
+      </p:ext>
+    </p:extLst>
+  </p:cSld>
+  <p:clrMapOvr>
+    <a:masterClrMapping/>
+  </p:clrMapOvr>
+  <p:timing>
+    <p:tnLst>
+      <p:par>
+        <p:cTn id="1" dur="indefinite" restart="never" nodeType="tmRoot"/>
+      </p:par>
+    </p:tnLst>
+  </p:timing>
+</p:sld>
+</file>
+
+<file path=ppt/slides/slide5.xml><?xml version="1.0" encoding="utf-8"?>
+<p:sld xmlns:a="http://schemas.openxmlformats.org/drawingml/2006/main" xmlns:r="http://schemas.openxmlformats.org/officeDocument/2006/relationships" xmlns:p="http://schemas.openxmlformats.org/presentationml/2006/main">
+  <p:cSld>
+    <p:spTree>
+      <p:nvGrpSpPr>
+        <p:cNvPr id="1" name=""/>
+        <p:cNvGrpSpPr/>
+        <p:nvPr/>
+      </p:nvGrpSpPr>
+      <p:grpSpPr>
+        <a:xfrm>
+          <a:off x="0" y="0"/>
+          <a:ext cx="0" cy="0"/>
+          <a:chOff x="0" y="0"/>
+          <a:chExt cx="0" cy="0"/>
+        </a:xfrm>
+      </p:grpSpPr>
+      <p:grpSp>
+        <p:nvGrpSpPr>
+          <p:cNvPr id="2" name="1 Grupo"/>
+          <p:cNvGrpSpPr/>
+          <p:nvPr/>
+        </p:nvGrpSpPr>
+        <p:grpSpPr>
+          <a:xfrm>
+            <a:off x="2195736" y="1125471"/>
+            <a:ext cx="3456384" cy="3456384"/>
+            <a:chOff x="2195736" y="1125471"/>
+            <a:chExt cx="3456384" cy="3456384"/>
+          </a:xfrm>
+        </p:grpSpPr>
+        <p:sp>
+          <p:nvSpPr>
+            <p:cNvPr id="4" name="3 Rectángulo"/>
+            <p:cNvSpPr/>
+            <p:nvPr/>
+          </p:nvSpPr>
+          <p:spPr>
+            <a:xfrm>
+              <a:off x="2195736" y="1125471"/>
+              <a:ext cx="3456384" cy="3456384"/>
+            </a:xfrm>
+            <a:prstGeom prst="rect">
+              <a:avLst/>
+            </a:prstGeom>
+            <a:solidFill>
+              <a:srgbClr val="38383D"/>
+            </a:solidFill>
+            <a:ln>
+              <a:noFill/>
+            </a:ln>
+          </p:spPr>
+          <p:style>
+            <a:lnRef idx="2">
+              <a:schemeClr val="accent1">
+                <a:shade val="50000"/>
+              </a:schemeClr>
+            </a:lnRef>
+            <a:fillRef idx="1">
+              <a:schemeClr val="accent1"/>
+            </a:fillRef>
+            <a:effectRef idx="0">
+              <a:schemeClr val="accent1"/>
+            </a:effectRef>
+            <a:fontRef idx="minor">
+              <a:schemeClr val="lt1"/>
+            </a:fontRef>
+          </p:style>
+          <p:txBody>
+            <a:bodyPr rtlCol="0" anchor="ctr"/>
+            <a:lstStyle/>
+            <a:p>
+              <a:pPr algn="ctr"/>
+              <a:endParaRPr lang="es-UY"/>
+            </a:p>
+          </p:txBody>
+        </p:sp>
+        <p:pic>
+          <p:nvPicPr>
             <p:cNvPr id="2050" name="Picture 2" descr="https://i.pinimg.com/originals/84/7c/08/847c083cc09040091439e3c05d1fedde.png"/>
             <p:cNvPicPr>
               <a:picLocks noChangeAspect="1" noChangeArrowheads="1"/>
@@ -5195,7 +6324,146 @@
 </p:sld>
 </file>
 
-<file path=ppt/slides/slide3.xml><?xml version="1.0" encoding="utf-8"?>
+<file path=ppt/slides/slide6.xml><?xml version="1.0" encoding="utf-8"?>
+<p:sld xmlns:a="http://schemas.openxmlformats.org/drawingml/2006/main" xmlns:r="http://schemas.openxmlformats.org/officeDocument/2006/relationships" xmlns:p="http://schemas.openxmlformats.org/presentationml/2006/main">
+  <p:cSld>
+    <p:spTree>
+      <p:nvGrpSpPr>
+        <p:cNvPr id="1" name=""/>
+        <p:cNvGrpSpPr/>
+        <p:nvPr/>
+      </p:nvGrpSpPr>
+      <p:grpSpPr>
+        <a:xfrm>
+          <a:off x="0" y="0"/>
+          <a:ext cx="0" cy="0"/>
+          <a:chOff x="0" y="0"/>
+          <a:chExt cx="0" cy="0"/>
+        </a:xfrm>
+      </p:grpSpPr>
+      <p:grpSp>
+        <p:nvGrpSpPr>
+          <p:cNvPr id="5" name="4 Grupo"/>
+          <p:cNvGrpSpPr/>
+          <p:nvPr/>
+        </p:nvGrpSpPr>
+        <p:grpSpPr>
+          <a:xfrm>
+            <a:off x="2195736" y="1124744"/>
+            <a:ext cx="3456384" cy="3456384"/>
+            <a:chOff x="2195736" y="1124744"/>
+            <a:chExt cx="3456384" cy="3456384"/>
+          </a:xfrm>
+        </p:grpSpPr>
+        <p:sp>
+          <p:nvSpPr>
+            <p:cNvPr id="4" name="3 Rectángulo"/>
+            <p:cNvSpPr/>
+            <p:nvPr/>
+          </p:nvSpPr>
+          <p:spPr>
+            <a:xfrm>
+              <a:off x="2195736" y="1124744"/>
+              <a:ext cx="3456384" cy="3456384"/>
+            </a:xfrm>
+            <a:prstGeom prst="rect">
+              <a:avLst/>
+            </a:prstGeom>
+            <a:solidFill>
+              <a:srgbClr val="38383D"/>
+            </a:solidFill>
+            <a:ln>
+              <a:noFill/>
+            </a:ln>
+          </p:spPr>
+          <p:style>
+            <a:lnRef idx="2">
+              <a:schemeClr val="accent1">
+                <a:shade val="50000"/>
+              </a:schemeClr>
+            </a:lnRef>
+            <a:fillRef idx="1">
+              <a:schemeClr val="accent1"/>
+            </a:fillRef>
+            <a:effectRef idx="0">
+              <a:schemeClr val="accent1"/>
+            </a:effectRef>
+            <a:fontRef idx="minor">
+              <a:schemeClr val="lt1"/>
+            </a:fontRef>
+          </p:style>
+          <p:txBody>
+            <a:bodyPr rtlCol="0" anchor="ctr"/>
+            <a:lstStyle/>
+            <a:p>
+              <a:pPr algn="ctr"/>
+              <a:endParaRPr lang="es-UY"/>
+            </a:p>
+          </p:txBody>
+        </p:sp>
+        <p:pic>
+          <p:nvPicPr>
+            <p:cNvPr id="1028" name="Picture 4" descr="C:\Users\Juan\Desktop\google.png"/>
+            <p:cNvPicPr>
+              <a:picLocks noChangeAspect="1" noChangeArrowheads="1"/>
+            </p:cNvPicPr>
+            <p:nvPr/>
+          </p:nvPicPr>
+          <p:blipFill>
+            <a:blip r:embed="rId3">
+              <a:extLst>
+                <a:ext uri="{28A0092B-C50C-407E-A947-70E740481C1C}">
+                  <a14:useLocalDpi xmlns:a14="http://schemas.microsoft.com/office/drawing/2010/main" val="0"/>
+                </a:ext>
+              </a:extLst>
+            </a:blip>
+            <a:srcRect/>
+            <a:stretch>
+              <a:fillRect/>
+            </a:stretch>
+          </p:blipFill>
+          <p:spPr bwMode="auto">
+            <a:xfrm>
+              <a:off x="2339752" y="1268760"/>
+              <a:ext cx="3168350" cy="3168352"/>
+            </a:xfrm>
+            <a:prstGeom prst="rect">
+              <a:avLst/>
+            </a:prstGeom>
+            <a:noFill/>
+            <a:extLst>
+              <a:ext uri="{909E8E84-426E-40DD-AFC4-6F175D3DCCD1}">
+                <a14:hiddenFill xmlns:a14="http://schemas.microsoft.com/office/drawing/2010/main">
+                  <a:solidFill>
+                    <a:srgbClr val="FFFFFF"/>
+                  </a:solidFill>
+                </a14:hiddenFill>
+              </a:ext>
+            </a:extLst>
+          </p:spPr>
+        </p:pic>
+      </p:grpSp>
+    </p:spTree>
+    <p:extLst>
+      <p:ext uri="{BB962C8B-B14F-4D97-AF65-F5344CB8AC3E}">
+        <p14:creationId xmlns:p14="http://schemas.microsoft.com/office/powerpoint/2010/main" val="2532933074"/>
+      </p:ext>
+    </p:extLst>
+  </p:cSld>
+  <p:clrMapOvr>
+    <a:masterClrMapping/>
+  </p:clrMapOvr>
+  <p:timing>
+    <p:tnLst>
+      <p:par>
+        <p:cTn id="1" dur="indefinite" restart="never" nodeType="tmRoot"/>
+      </p:par>
+    </p:tnLst>
+  </p:timing>
+</p:sld>
+</file>
+
+<file path=ppt/slides/slide7.xml><?xml version="1.0" encoding="utf-8"?>
 <p:sld xmlns:a="http://schemas.openxmlformats.org/drawingml/2006/main" xmlns:r="http://schemas.openxmlformats.org/officeDocument/2006/relationships" xmlns:p="http://schemas.openxmlformats.org/presentationml/2006/main">
   <p:cSld>
     <p:spTree>
@@ -5334,7 +6602,7 @@
 </p:sld>
 </file>
 
-<file path=ppt/slides/slide4.xml><?xml version="1.0" encoding="utf-8"?>
+<file path=ppt/slides/slide8.xml><?xml version="1.0" encoding="utf-8"?>
 <p:sld xmlns:a="http://schemas.openxmlformats.org/drawingml/2006/main" xmlns:r="http://schemas.openxmlformats.org/officeDocument/2006/relationships" xmlns:p="http://schemas.openxmlformats.org/presentationml/2006/main">
   <p:cSld>
     <p:spTree>
@@ -5353,15 +6621,15 @@
       </p:grpSpPr>
       <p:grpSp>
         <p:nvGrpSpPr>
-          <p:cNvPr id="2" name="1 Grupo"/>
+          <p:cNvPr id="3" name="2 Grupo"/>
           <p:cNvGrpSpPr/>
           <p:nvPr/>
         </p:nvGrpSpPr>
         <p:grpSpPr>
           <a:xfrm>
-            <a:off x="2195736" y="1125471"/>
+            <a:off x="2195736" y="1124744"/>
             <a:ext cx="3456384" cy="3456384"/>
-            <a:chOff x="2195736" y="1125471"/>
+            <a:chOff x="2195736" y="1124744"/>
             <a:chExt cx="3456384" cy="3456384"/>
           </a:xfrm>
         </p:grpSpPr>
@@ -5373,7 +6641,7 @@
           </p:nvSpPr>
           <p:spPr>
             <a:xfrm>
-              <a:off x="2195736" y="1125471"/>
+              <a:off x="2195736" y="1124744"/>
               <a:ext cx="3456384" cy="3456384"/>
             </a:xfrm>
             <a:prstGeom prst="rect">
@@ -5411,650 +6679,113 @@
             </a:p>
           </p:txBody>
         </p:sp>
-        <p:pic>
-          <p:nvPicPr>
-            <p:cNvPr id="4100" name="Picture 4" descr="https://is3-ssl.mzstatic.com/image/thumb/Purple113/v4/ed/69/8d/ed698d73-6773-80b7-4ad8-b7c4fc17dc95/AppIcon-0-0-1x_U007emarketing-0-0-0-7-0-0-sRGB-0-0-0-GLES2_U002c0-512MB-85-220-0-0.png/400x400.png"/>
-            <p:cNvPicPr>
-              <a:picLocks noChangeAspect="1" noChangeArrowheads="1"/>
-            </p:cNvPicPr>
+        <p:grpSp>
+          <p:nvGrpSpPr>
+            <p:cNvPr id="2" name="1 Grupo"/>
+            <p:cNvGrpSpPr/>
             <p:nvPr/>
-          </p:nvPicPr>
-          <p:blipFill rotWithShape="1">
-            <a:blip r:embed="rId3">
+          </p:nvGrpSpPr>
+          <p:grpSpPr>
+            <a:xfrm>
+              <a:off x="2267744" y="1196752"/>
+              <a:ext cx="3312368" cy="3312368"/>
+              <a:chOff x="2267744" y="1196752"/>
+              <a:chExt cx="3312368" cy="3312368"/>
+            </a:xfrm>
+          </p:grpSpPr>
+          <p:sp>
+            <p:nvSpPr>
+              <p:cNvPr id="5" name="4 Rectángulo"/>
+              <p:cNvSpPr/>
+              <p:nvPr/>
+            </p:nvSpPr>
+            <p:spPr>
+              <a:xfrm>
+                <a:off x="2591780" y="1444279"/>
+                <a:ext cx="2664296" cy="2817313"/>
+              </a:xfrm>
+              <a:prstGeom prst="rect">
+                <a:avLst/>
+              </a:prstGeom>
+              <a:solidFill>
+                <a:schemeClr val="bg1"/>
+              </a:solidFill>
+              <a:ln>
+                <a:noFill/>
+              </a:ln>
+            </p:spPr>
+            <p:style>
+              <a:lnRef idx="2">
+                <a:schemeClr val="accent1">
+                  <a:shade val="50000"/>
+                </a:schemeClr>
+              </a:lnRef>
+              <a:fillRef idx="1">
+                <a:schemeClr val="accent1"/>
+              </a:fillRef>
+              <a:effectRef idx="0">
+                <a:schemeClr val="accent1"/>
+              </a:effectRef>
+              <a:fontRef idx="minor">
+                <a:schemeClr val="lt1"/>
+              </a:fontRef>
+            </p:style>
+            <p:txBody>
+              <a:bodyPr rtlCol="0" anchor="ctr"/>
+              <a:lstStyle/>
+              <a:p>
+                <a:pPr algn="ctr"/>
+                <a:endParaRPr lang="es-UY"/>
+              </a:p>
+            </p:txBody>
+          </p:sp>
+          <p:pic>
+            <p:nvPicPr>
+              <p:cNvPr id="3074" name="Picture 2" descr="Resultado de imagen para instagram icon"/>
+              <p:cNvPicPr>
+                <a:picLocks noChangeAspect="1" noChangeArrowheads="1"/>
+              </p:cNvPicPr>
+              <p:nvPr/>
+            </p:nvPicPr>
+            <p:blipFill>
+              <a:blip r:embed="rId3">
+                <a:extLst>
+                  <a:ext uri="{28A0092B-C50C-407E-A947-70E740481C1C}">
+                    <a14:useLocalDpi xmlns:a14="http://schemas.microsoft.com/office/drawing/2010/main" val="0"/>
+                  </a:ext>
+                </a:extLst>
+              </a:blip>
+              <a:srcRect/>
+              <a:stretch>
+                <a:fillRect/>
+              </a:stretch>
+            </p:blipFill>
+            <p:spPr bwMode="auto">
+              <a:xfrm>
+                <a:off x="2267744" y="1196752"/>
+                <a:ext cx="3312368" cy="3312368"/>
+              </a:xfrm>
+              <a:prstGeom prst="rect">
+                <a:avLst/>
+              </a:prstGeom>
+              <a:noFill/>
               <a:extLst>
-                <a:ext uri="{BEBA8EAE-BF5A-486C-A8C5-ECC9F3942E4B}">
-                  <a14:imgProps xmlns:a14="http://schemas.microsoft.com/office/drawing/2010/main">
-                    <a14:imgLayer r:embed="rId4">
-                      <a14:imgEffect>
-                        <a14:backgroundRemoval t="10000" b="90000" l="10000" r="90000">
-                          <a14:foregroundMark x1="38000" y1="43250" x2="38000" y2="43250"/>
-                          <a14:foregroundMark x1="49250" y1="50500" x2="49250" y2="50500"/>
-                          <a14:foregroundMark x1="47750" y1="47250" x2="47750" y2="47250"/>
-                          <a14:foregroundMark x1="47750" y1="47250" x2="47750" y2="47250"/>
-                          <a14:foregroundMark x1="41000" y1="31750" x2="41000" y2="31750"/>
-                          <a14:foregroundMark x1="39750" y1="36750" x2="57000" y2="58750"/>
-                          <a14:foregroundMark x1="40750" y1="55750" x2="60750" y2="37750"/>
-                          <a14:foregroundMark x1="42750" y1="50250" x2="55000" y2="43750"/>
-                          <a14:foregroundMark x1="42250" y1="55000" x2="58750" y2="48250"/>
-                          <a14:foregroundMark x1="41500" y1="59500" x2="58500" y2="51000"/>
-                          <a14:foregroundMark x1="51000" y1="34500" x2="51000" y2="23250"/>
-                          <a14:foregroundMark x1="58000" y1="35750" x2="80500" y2="45750"/>
-                          <a14:foregroundMark x1="58250" y1="27250" x2="74750" y2="44250"/>
-                          <a14:foregroundMark x1="71000" y1="42750" x2="65750" y2="65500"/>
-                          <a14:foregroundMark x1="67500" y1="61250" x2="74500" y2="57000"/>
-                          <a14:foregroundMark x1="69500" y1="54000" x2="72750" y2="42500"/>
-                          <a14:foregroundMark x1="71000" y1="59500" x2="71000" y2="44000"/>
-                          <a14:foregroundMark x1="61000" y1="68500" x2="43250" y2="75250"/>
-                          <a14:foregroundMark x1="60000" y1="63250" x2="43000" y2="65750"/>
-                          <a14:foregroundMark x1="42000" y1="70000" x2="24000" y2="67500"/>
-                          <a14:foregroundMark x1="44750" y1="67500" x2="25500" y2="61000"/>
-                          <a14:foregroundMark x1="35000" y1="65000" x2="26750" y2="57500"/>
-                          <a14:foregroundMark x1="37250" y1="59000" x2="25250" y2="50750"/>
-                          <a14:foregroundMark x1="35250" y1="56000" x2="28750" y2="40500"/>
-                          <a14:foregroundMark x1="31750" y1="52000" x2="36000" y2="31250"/>
-                          <a14:foregroundMark x1="34750" y1="45250" x2="45000" y2="25750"/>
-                          <a14:foregroundMark x1="43750" y1="33250" x2="64250" y2="21000"/>
-                          <a14:foregroundMark x1="56250" y1="34250" x2="71250" y2="33750"/>
-                          <a14:foregroundMark x1="60500" y1="34250" x2="73000" y2="42000"/>
-                          <a14:foregroundMark x1="66500" y1="44750" x2="79250" y2="52000"/>
-                          <a14:foregroundMark x1="66250" y1="49500" x2="74000" y2="62000"/>
-                          <a14:foregroundMark x1="65500" y1="56500" x2="65250" y2="67000"/>
-                          <a14:foregroundMark x1="58250" y1="59000" x2="49500" y2="67750"/>
-                          <a14:foregroundMark x1="46750" y1="61500" x2="40750" y2="69500"/>
-                          <a14:foregroundMark x1="39500" y1="64250" x2="29500" y2="69500"/>
-                          <a14:foregroundMark x1="32250" y1="60000" x2="15500" y2="56000"/>
-                          <a14:foregroundMark x1="28250" y1="55750" x2="21500" y2="47500"/>
-                          <a14:foregroundMark x1="31000" y1="51500" x2="23000" y2="40000"/>
-                          <a14:foregroundMark x1="31750" y1="45000" x2="26250" y2="28250"/>
-                          <a14:foregroundMark x1="32000" y1="33250" x2="38000" y2="22250"/>
-                        </a14:backgroundRemoval>
-                      </a14:imgEffect>
-                    </a14:imgLayer>
-                  </a14:imgProps>
-                </a:ext>
-                <a:ext uri="{28A0092B-C50C-407E-A947-70E740481C1C}">
-                  <a14:useLocalDpi xmlns:a14="http://schemas.microsoft.com/office/drawing/2010/main" val="0"/>
+                <a:ext uri="{909E8E84-426E-40DD-AFC4-6F175D3DCCD1}">
+                  <a14:hiddenFill xmlns:a14="http://schemas.microsoft.com/office/drawing/2010/main">
+                    <a:solidFill>
+                      <a:srgbClr val="FFFFFF"/>
+                    </a:solidFill>
+                  </a14:hiddenFill>
                 </a:ext>
               </a:extLst>
-            </a:blip>
-            <a:srcRect l="8843" t="8843" r="8843" b="8843"/>
-            <a:stretch/>
-          </p:blipFill>
-          <p:spPr bwMode="auto">
-            <a:xfrm>
-              <a:off x="2267017" y="1196752"/>
-              <a:ext cx="3313822" cy="3313822"/>
-            </a:xfrm>
-            <a:prstGeom prst="rect">
-              <a:avLst/>
-            </a:prstGeom>
-            <a:noFill/>
-            <a:extLst>
-              <a:ext uri="{909E8E84-426E-40DD-AFC4-6F175D3DCCD1}">
-                <a14:hiddenFill xmlns:a14="http://schemas.microsoft.com/office/drawing/2010/main">
-                  <a:solidFill>
-                    <a:srgbClr val="FFFFFF"/>
-                  </a:solidFill>
-                </a14:hiddenFill>
-              </a:ext>
-            </a:extLst>
-          </p:spPr>
-        </p:pic>
+            </p:spPr>
+          </p:pic>
+        </p:grpSp>
       </p:grpSp>
     </p:spTree>
     <p:extLst>
       <p:ext uri="{BB962C8B-B14F-4D97-AF65-F5344CB8AC3E}">
-        <p14:creationId xmlns:p14="http://schemas.microsoft.com/office/powerpoint/2010/main" val="2643687619"/>
-      </p:ext>
-    </p:extLst>
-  </p:cSld>
-  <p:clrMapOvr>
-    <a:masterClrMapping/>
-  </p:clrMapOvr>
-  <p:timing>
-    <p:tnLst>
-      <p:par>
-        <p:cTn id="1" dur="indefinite" restart="never" nodeType="tmRoot"/>
-      </p:par>
-    </p:tnLst>
-  </p:timing>
-</p:sld>
-</file>
-
-<file path=ppt/slides/slide5.xml><?xml version="1.0" encoding="utf-8"?>
-<p:sld xmlns:a="http://schemas.openxmlformats.org/drawingml/2006/main" xmlns:r="http://schemas.openxmlformats.org/officeDocument/2006/relationships" xmlns:p="http://schemas.openxmlformats.org/presentationml/2006/main">
-  <p:cSld>
-    <p:spTree>
-      <p:nvGrpSpPr>
-        <p:cNvPr id="1" name=""/>
-        <p:cNvGrpSpPr/>
-        <p:nvPr/>
-      </p:nvGrpSpPr>
-      <p:grpSpPr>
-        <a:xfrm>
-          <a:off x="0" y="0"/>
-          <a:ext cx="0" cy="0"/>
-          <a:chOff x="0" y="0"/>
-          <a:chExt cx="0" cy="0"/>
-        </a:xfrm>
-      </p:grpSpPr>
-      <p:grpSp>
-        <p:nvGrpSpPr>
-          <p:cNvPr id="2" name="1 Grupo"/>
-          <p:cNvGrpSpPr/>
-          <p:nvPr/>
-        </p:nvGrpSpPr>
-        <p:grpSpPr>
-          <a:xfrm>
-            <a:off x="2195736" y="1125471"/>
-            <a:ext cx="3456384" cy="3456384"/>
-            <a:chOff x="2195736" y="1125471"/>
-            <a:chExt cx="3456384" cy="3456384"/>
-          </a:xfrm>
-        </p:grpSpPr>
-        <p:sp>
-          <p:nvSpPr>
-            <p:cNvPr id="4" name="3 Rectángulo"/>
-            <p:cNvSpPr/>
-            <p:nvPr/>
-          </p:nvSpPr>
-          <p:spPr>
-            <a:xfrm>
-              <a:off x="2195736" y="1125471"/>
-              <a:ext cx="3456384" cy="3456384"/>
-            </a:xfrm>
-            <a:prstGeom prst="rect">
-              <a:avLst/>
-            </a:prstGeom>
-            <a:solidFill>
-              <a:srgbClr val="38383D"/>
-            </a:solidFill>
-            <a:ln>
-              <a:noFill/>
-            </a:ln>
-          </p:spPr>
-          <p:style>
-            <a:lnRef idx="2">
-              <a:schemeClr val="accent1">
-                <a:shade val="50000"/>
-              </a:schemeClr>
-            </a:lnRef>
-            <a:fillRef idx="1">
-              <a:schemeClr val="accent1"/>
-            </a:fillRef>
-            <a:effectRef idx="0">
-              <a:schemeClr val="accent1"/>
-            </a:effectRef>
-            <a:fontRef idx="minor">
-              <a:schemeClr val="lt1"/>
-            </a:fontRef>
-          </p:style>
-          <p:txBody>
-            <a:bodyPr rtlCol="0" anchor="ctr"/>
-            <a:lstStyle/>
-            <a:p>
-              <a:pPr algn="ctr"/>
-              <a:endParaRPr lang="es-UY"/>
-            </a:p>
-          </p:txBody>
-        </p:sp>
-        <p:pic>
-          <p:nvPicPr>
-            <p:cNvPr id="5" name="Picture 2" descr="https://i.pinimg.com/originals/79/dc/31/79dc31280371b8ffbe56ec656418e122.png"/>
-            <p:cNvPicPr>
-              <a:picLocks noChangeAspect="1" noChangeArrowheads="1"/>
-            </p:cNvPicPr>
-            <p:nvPr/>
-          </p:nvPicPr>
-          <p:blipFill rotWithShape="1">
-            <a:blip r:embed="rId3">
-              <a:extLst>
-                <a:ext uri="{28A0092B-C50C-407E-A947-70E740481C1C}">
-                  <a14:useLocalDpi xmlns:a14="http://schemas.microsoft.com/office/drawing/2010/main" val="0"/>
-                </a:ext>
-              </a:extLst>
-            </a:blip>
-            <a:srcRect l="13182" t="13182" r="13182" b="13182"/>
-            <a:stretch/>
-          </p:blipFill>
-          <p:spPr bwMode="auto">
-            <a:xfrm>
-              <a:off x="2195736" y="1125471"/>
-              <a:ext cx="3456384" cy="3456384"/>
-            </a:xfrm>
-            <a:prstGeom prst="rect">
-              <a:avLst/>
-            </a:prstGeom>
-            <a:noFill/>
-            <a:extLst>
-              <a:ext uri="{909E8E84-426E-40DD-AFC4-6F175D3DCCD1}">
-                <a14:hiddenFill xmlns:a14="http://schemas.microsoft.com/office/drawing/2010/main">
-                  <a:solidFill>
-                    <a:srgbClr val="FFFFFF"/>
-                  </a:solidFill>
-                </a14:hiddenFill>
-              </a:ext>
-            </a:extLst>
-          </p:spPr>
-        </p:pic>
-      </p:grpSp>
-    </p:spTree>
-    <p:extLst>
-      <p:ext uri="{BB962C8B-B14F-4D97-AF65-F5344CB8AC3E}">
-        <p14:creationId xmlns:p14="http://schemas.microsoft.com/office/powerpoint/2010/main" val="4240436308"/>
-      </p:ext>
-    </p:extLst>
-  </p:cSld>
-  <p:clrMapOvr>
-    <a:masterClrMapping/>
-  </p:clrMapOvr>
-  <p:timing>
-    <p:tnLst>
-      <p:par>
-        <p:cTn id="1" dur="indefinite" restart="never" nodeType="tmRoot"/>
-      </p:par>
-    </p:tnLst>
-  </p:timing>
-</p:sld>
-</file>
-
-<file path=ppt/slides/slide6.xml><?xml version="1.0" encoding="utf-8"?>
-<p:sld xmlns:a="http://schemas.openxmlformats.org/drawingml/2006/main" xmlns:r="http://schemas.openxmlformats.org/officeDocument/2006/relationships" xmlns:p="http://schemas.openxmlformats.org/presentationml/2006/main">
-  <p:cSld>
-    <p:spTree>
-      <p:nvGrpSpPr>
-        <p:cNvPr id="1" name=""/>
-        <p:cNvGrpSpPr/>
-        <p:nvPr/>
-      </p:nvGrpSpPr>
-      <p:grpSpPr>
-        <a:xfrm>
-          <a:off x="0" y="0"/>
-          <a:ext cx="0" cy="0"/>
-          <a:chOff x="0" y="0"/>
-          <a:chExt cx="0" cy="0"/>
-        </a:xfrm>
-      </p:grpSpPr>
-      <p:grpSp>
-        <p:nvGrpSpPr>
-          <p:cNvPr id="2" name="1 Grupo"/>
-          <p:cNvGrpSpPr/>
-          <p:nvPr/>
-        </p:nvGrpSpPr>
-        <p:grpSpPr>
-          <a:xfrm>
-            <a:off x="2195736" y="1125471"/>
-            <a:ext cx="3456384" cy="3456384"/>
-            <a:chOff x="2195736" y="1125471"/>
-            <a:chExt cx="3456384" cy="3456384"/>
-          </a:xfrm>
-        </p:grpSpPr>
-        <p:sp>
-          <p:nvSpPr>
-            <p:cNvPr id="4" name="3 Rectángulo"/>
-            <p:cNvSpPr/>
-            <p:nvPr/>
-          </p:nvSpPr>
-          <p:spPr>
-            <a:xfrm>
-              <a:off x="2195736" y="1125471"/>
-              <a:ext cx="3456384" cy="3456384"/>
-            </a:xfrm>
-            <a:prstGeom prst="rect">
-              <a:avLst/>
-            </a:prstGeom>
-            <a:solidFill>
-              <a:srgbClr val="38383D"/>
-            </a:solidFill>
-            <a:ln>
-              <a:noFill/>
-            </a:ln>
-          </p:spPr>
-          <p:style>
-            <a:lnRef idx="2">
-              <a:schemeClr val="accent1">
-                <a:shade val="50000"/>
-              </a:schemeClr>
-            </a:lnRef>
-            <a:fillRef idx="1">
-              <a:schemeClr val="accent1"/>
-            </a:fillRef>
-            <a:effectRef idx="0">
-              <a:schemeClr val="accent1"/>
-            </a:effectRef>
-            <a:fontRef idx="minor">
-              <a:schemeClr val="lt1"/>
-            </a:fontRef>
-          </p:style>
-          <p:txBody>
-            <a:bodyPr rtlCol="0" anchor="ctr"/>
-            <a:lstStyle/>
-            <a:p>
-              <a:pPr algn="ctr"/>
-              <a:endParaRPr lang="es-UY"/>
-            </a:p>
-          </p:txBody>
-        </p:sp>
-        <p:pic>
-          <p:nvPicPr>
-            <p:cNvPr id="6146" name="Picture 2" descr="https://cdn3.iconfinder.com/data/icons/popular-services-brands-vol-2/512/telegram-512.png"/>
-            <p:cNvPicPr>
-              <a:picLocks noChangeAspect="1" noChangeArrowheads="1"/>
-            </p:cNvPicPr>
-            <p:nvPr/>
-          </p:nvPicPr>
-          <p:blipFill>
-            <a:blip r:embed="rId3">
-              <a:extLst>
-                <a:ext uri="{28A0092B-C50C-407E-A947-70E740481C1C}">
-                  <a14:useLocalDpi xmlns:a14="http://schemas.microsoft.com/office/drawing/2010/main" val="0"/>
-                </a:ext>
-              </a:extLst>
-            </a:blip>
-            <a:srcRect/>
-            <a:stretch>
-              <a:fillRect/>
-            </a:stretch>
-          </p:blipFill>
-          <p:spPr bwMode="auto">
-            <a:xfrm>
-              <a:off x="2339026" y="1268760"/>
-              <a:ext cx="3169804" cy="3169806"/>
-            </a:xfrm>
-            <a:prstGeom prst="rect">
-              <a:avLst/>
-            </a:prstGeom>
-            <a:noFill/>
-            <a:extLst>
-              <a:ext uri="{909E8E84-426E-40DD-AFC4-6F175D3DCCD1}">
-                <a14:hiddenFill xmlns:a14="http://schemas.microsoft.com/office/drawing/2010/main">
-                  <a:solidFill>
-                    <a:srgbClr val="FFFFFF"/>
-                  </a:solidFill>
-                </a14:hiddenFill>
-              </a:ext>
-            </a:extLst>
-          </p:spPr>
-        </p:pic>
-      </p:grpSp>
-    </p:spTree>
-    <p:extLst>
-      <p:ext uri="{BB962C8B-B14F-4D97-AF65-F5344CB8AC3E}">
-        <p14:creationId xmlns:p14="http://schemas.microsoft.com/office/powerpoint/2010/main" val="2680816217"/>
-      </p:ext>
-    </p:extLst>
-  </p:cSld>
-  <p:clrMapOvr>
-    <a:masterClrMapping/>
-  </p:clrMapOvr>
-  <p:timing>
-    <p:tnLst>
-      <p:par>
-        <p:cTn id="1" dur="indefinite" restart="never" nodeType="tmRoot"/>
-      </p:par>
-    </p:tnLst>
-  </p:timing>
-</p:sld>
-</file>
-
-<file path=ppt/slides/slide7.xml><?xml version="1.0" encoding="utf-8"?>
-<p:sld xmlns:a="http://schemas.openxmlformats.org/drawingml/2006/main" xmlns:r="http://schemas.openxmlformats.org/officeDocument/2006/relationships" xmlns:p="http://schemas.openxmlformats.org/presentationml/2006/main">
-  <p:cSld>
-    <p:spTree>
-      <p:nvGrpSpPr>
-        <p:cNvPr id="1" name=""/>
-        <p:cNvGrpSpPr/>
-        <p:nvPr/>
-      </p:nvGrpSpPr>
-      <p:grpSpPr>
-        <a:xfrm>
-          <a:off x="0" y="0"/>
-          <a:ext cx="0" cy="0"/>
-          <a:chOff x="0" y="0"/>
-          <a:chExt cx="0" cy="0"/>
-        </a:xfrm>
-      </p:grpSpPr>
-      <p:grpSp>
-        <p:nvGrpSpPr>
-          <p:cNvPr id="2" name="1 Grupo"/>
-          <p:cNvGrpSpPr/>
-          <p:nvPr/>
-        </p:nvGrpSpPr>
-        <p:grpSpPr>
-          <a:xfrm>
-            <a:off x="2195736" y="1125471"/>
-            <a:ext cx="3456384" cy="3456384"/>
-            <a:chOff x="2195736" y="1125471"/>
-            <a:chExt cx="3456384" cy="3456384"/>
-          </a:xfrm>
-        </p:grpSpPr>
-        <p:sp>
-          <p:nvSpPr>
-            <p:cNvPr id="4" name="3 Rectángulo"/>
-            <p:cNvSpPr/>
-            <p:nvPr/>
-          </p:nvSpPr>
-          <p:spPr>
-            <a:xfrm>
-              <a:off x="2195736" y="1125471"/>
-              <a:ext cx="3456384" cy="3456384"/>
-            </a:xfrm>
-            <a:prstGeom prst="rect">
-              <a:avLst/>
-            </a:prstGeom>
-            <a:solidFill>
-              <a:srgbClr val="38383D"/>
-            </a:solidFill>
-            <a:ln>
-              <a:noFill/>
-            </a:ln>
-          </p:spPr>
-          <p:style>
-            <a:lnRef idx="2">
-              <a:schemeClr val="accent1">
-                <a:shade val="50000"/>
-              </a:schemeClr>
-            </a:lnRef>
-            <a:fillRef idx="1">
-              <a:schemeClr val="accent1"/>
-            </a:fillRef>
-            <a:effectRef idx="0">
-              <a:schemeClr val="accent1"/>
-            </a:effectRef>
-            <a:fontRef idx="minor">
-              <a:schemeClr val="lt1"/>
-            </a:fontRef>
-          </p:style>
-          <p:txBody>
-            <a:bodyPr rtlCol="0" anchor="ctr"/>
-            <a:lstStyle/>
-            <a:p>
-              <a:pPr algn="ctr"/>
-              <a:endParaRPr lang="es-UY"/>
-            </a:p>
-          </p:txBody>
-        </p:sp>
-        <p:pic>
-          <p:nvPicPr>
-            <p:cNvPr id="7170" name="Picture 2" descr="https://ev1.utec.edu.uy/moodle/theme/image.php/klass/theme/1574170910/home/logo"/>
-            <p:cNvPicPr>
-              <a:picLocks noChangeAspect="1" noChangeArrowheads="1"/>
-            </p:cNvPicPr>
-            <p:nvPr/>
-          </p:nvPicPr>
-          <p:blipFill rotWithShape="1">
-            <a:blip r:embed="rId3">
-              <a:extLst>
-                <a:ext uri="{28A0092B-C50C-407E-A947-70E740481C1C}">
-                  <a14:useLocalDpi xmlns:a14="http://schemas.microsoft.com/office/drawing/2010/main" val="0"/>
-                </a:ext>
-              </a:extLst>
-            </a:blip>
-            <a:srcRect l="-5" r="79355" b="22630"/>
-            <a:stretch/>
-          </p:blipFill>
-          <p:spPr bwMode="auto">
-            <a:xfrm>
-              <a:off x="2483768" y="1923829"/>
-              <a:ext cx="3015149" cy="1632906"/>
-            </a:xfrm>
-            <a:prstGeom prst="rect">
-              <a:avLst/>
-            </a:prstGeom>
-            <a:noFill/>
-            <a:extLst>
-              <a:ext uri="{909E8E84-426E-40DD-AFC4-6F175D3DCCD1}">
-                <a14:hiddenFill xmlns:a14="http://schemas.microsoft.com/office/drawing/2010/main">
-                  <a:solidFill>
-                    <a:srgbClr val="FFFFFF"/>
-                  </a:solidFill>
-                </a14:hiddenFill>
-              </a:ext>
-            </a:extLst>
-          </p:spPr>
-        </p:pic>
-      </p:grpSp>
-    </p:spTree>
-    <p:extLst>
-      <p:ext uri="{BB962C8B-B14F-4D97-AF65-F5344CB8AC3E}">
-        <p14:creationId xmlns:p14="http://schemas.microsoft.com/office/powerpoint/2010/main" val="2062562605"/>
-      </p:ext>
-    </p:extLst>
-  </p:cSld>
-  <p:clrMapOvr>
-    <a:masterClrMapping/>
-  </p:clrMapOvr>
-  <p:timing>
-    <p:tnLst>
-      <p:par>
-        <p:cTn id="1" dur="indefinite" restart="never" nodeType="tmRoot"/>
-      </p:par>
-    </p:tnLst>
-  </p:timing>
-</p:sld>
-</file>
-
-<file path=ppt/slides/slide8.xml><?xml version="1.0" encoding="utf-8"?>
-<p:sld xmlns:a="http://schemas.openxmlformats.org/drawingml/2006/main" xmlns:r="http://schemas.openxmlformats.org/officeDocument/2006/relationships" xmlns:p="http://schemas.openxmlformats.org/presentationml/2006/main">
-  <p:cSld>
-    <p:spTree>
-      <p:nvGrpSpPr>
-        <p:cNvPr id="1" name=""/>
-        <p:cNvGrpSpPr/>
-        <p:nvPr/>
-      </p:nvGrpSpPr>
-      <p:grpSpPr>
-        <a:xfrm>
-          <a:off x="0" y="0"/>
-          <a:ext cx="0" cy="0"/>
-          <a:chOff x="0" y="0"/>
-          <a:chExt cx="0" cy="0"/>
-        </a:xfrm>
-      </p:grpSpPr>
-      <p:grpSp>
-        <p:nvGrpSpPr>
-          <p:cNvPr id="3" name="2 Grupo"/>
-          <p:cNvGrpSpPr/>
-          <p:nvPr/>
-        </p:nvGrpSpPr>
-        <p:grpSpPr>
-          <a:xfrm>
-            <a:off x="2195736" y="1125471"/>
-            <a:ext cx="3456384" cy="3456384"/>
-            <a:chOff x="2195736" y="1125471"/>
-            <a:chExt cx="3456384" cy="3456384"/>
-          </a:xfrm>
-        </p:grpSpPr>
-        <p:sp>
-          <p:nvSpPr>
-            <p:cNvPr id="4" name="3 Rectángulo"/>
-            <p:cNvSpPr/>
-            <p:nvPr/>
-          </p:nvSpPr>
-          <p:spPr>
-            <a:xfrm>
-              <a:off x="2195736" y="1125471"/>
-              <a:ext cx="3456384" cy="3456384"/>
-            </a:xfrm>
-            <a:prstGeom prst="rect">
-              <a:avLst/>
-            </a:prstGeom>
-            <a:solidFill>
-              <a:srgbClr val="38383D"/>
-            </a:solidFill>
-            <a:ln>
-              <a:noFill/>
-            </a:ln>
-          </p:spPr>
-          <p:style>
-            <a:lnRef idx="2">
-              <a:schemeClr val="accent1">
-                <a:shade val="50000"/>
-              </a:schemeClr>
-            </a:lnRef>
-            <a:fillRef idx="1">
-              <a:schemeClr val="accent1"/>
-            </a:fillRef>
-            <a:effectRef idx="0">
-              <a:schemeClr val="accent1"/>
-            </a:effectRef>
-            <a:fontRef idx="minor">
-              <a:schemeClr val="lt1"/>
-            </a:fontRef>
-          </p:style>
-          <p:txBody>
-            <a:bodyPr rtlCol="0" anchor="ctr"/>
-            <a:lstStyle/>
-            <a:p>
-              <a:pPr algn="ctr"/>
-              <a:endParaRPr lang="es-UY"/>
-            </a:p>
-          </p:txBody>
-        </p:sp>
-        <p:pic>
-          <p:nvPicPr>
-            <p:cNvPr id="1027" name="Picture 3" descr="C:\Users\Juan\Downloads\chess-icon-11288.png"/>
-            <p:cNvPicPr>
-              <a:picLocks noChangeAspect="1" noChangeArrowheads="1"/>
-            </p:cNvPicPr>
-            <p:nvPr/>
-          </p:nvPicPr>
-          <p:blipFill rotWithShape="1">
-            <a:blip r:embed="rId3">
-              <a:extLst>
-                <a:ext uri="{28A0092B-C50C-407E-A947-70E740481C1C}">
-                  <a14:useLocalDpi xmlns:a14="http://schemas.microsoft.com/office/drawing/2010/main" val="0"/>
-                </a:ext>
-              </a:extLst>
-            </a:blip>
-            <a:srcRect l="5717" t="3941" r="3368" b="5120"/>
-            <a:stretch/>
-          </p:blipFill>
-          <p:spPr bwMode="auto">
-            <a:xfrm>
-              <a:off x="2335463" y="1268760"/>
-              <a:ext cx="3176930" cy="3169806"/>
-            </a:xfrm>
-            <a:prstGeom prst="rect">
-              <a:avLst/>
-            </a:prstGeom>
-            <a:noFill/>
-            <a:extLst>
-              <a:ext uri="{909E8E84-426E-40DD-AFC4-6F175D3DCCD1}">
-                <a14:hiddenFill xmlns:a14="http://schemas.microsoft.com/office/drawing/2010/main">
-                  <a:solidFill>
-                    <a:srgbClr val="FFFFFF"/>
-                  </a:solidFill>
-                </a14:hiddenFill>
-              </a:ext>
-            </a:extLst>
-          </p:spPr>
-        </p:pic>
-      </p:grpSp>
-    </p:spTree>
-    <p:extLst>
-      <p:ext uri="{BB962C8B-B14F-4D97-AF65-F5344CB8AC3E}">
-        <p14:creationId xmlns:p14="http://schemas.microsoft.com/office/powerpoint/2010/main" val="1533916593"/>
+        <p14:creationId xmlns:p14="http://schemas.microsoft.com/office/powerpoint/2010/main" val="198720179"/>
       </p:ext>
     </p:extLst>
   </p:cSld>
@@ -6150,7 +6881,7 @@
         </p:sp>
         <p:pic>
           <p:nvPicPr>
-            <p:cNvPr id="3074" name="Picture 2" descr="https://pbs.twimg.com/profile_images/1206960097412501504/Ic61D7tZ_400x400.jpg"/>
+            <p:cNvPr id="8200" name="Picture 8" descr="https://us.123rf.com/450wm/sonulkaster/sonulkaster1708/sonulkaster170800219/83783486-combinaci%C3%B3n-de-ases-de-juegos-de-casino-para-el-icono-de-vector-de-juego-de-poker-o-solitario.jpg?ver=6"/>
             <p:cNvPicPr>
               <a:picLocks noChangeAspect="1" noChangeArrowheads="1"/>
             </p:cNvPicPr>
@@ -6163,7 +6894,7 @@
                   <a14:imgProps xmlns:a14="http://schemas.microsoft.com/office/drawing/2010/main">
                     <a14:imgLayer r:embed="rId4">
                       <a14:imgEffect>
-                        <a14:backgroundRemoval t="5500" b="92000" l="12750" r="87250"/>
+                        <a14:backgroundRemoval t="10000" b="90000" l="10000" r="90000"/>
                       </a14:imgEffect>
                     </a14:imgLayer>
                   </a14:imgProps>
@@ -6173,13 +6904,13 @@
                 </a:ext>
               </a:extLst>
             </a:blip>
-            <a:srcRect l="19144" t="3800" r="19144" b="7890"/>
+            <a:srcRect l="17501" t="13466" r="17501" b="13466"/>
             <a:stretch/>
           </p:blipFill>
           <p:spPr bwMode="auto">
             <a:xfrm>
-              <a:off x="2771800" y="1204975"/>
-              <a:ext cx="2304256" cy="3297376"/>
+              <a:off x="2530929" y="1287718"/>
+              <a:ext cx="2785998" cy="3131890"/>
             </a:xfrm>
             <a:prstGeom prst="rect">
               <a:avLst/>
@@ -6200,7 +6931,7 @@
     </p:spTree>
     <p:extLst>
       <p:ext uri="{BB962C8B-B14F-4D97-AF65-F5344CB8AC3E}">
-        <p14:creationId xmlns:p14="http://schemas.microsoft.com/office/powerpoint/2010/main" val="689486972"/>
+        <p14:creationId xmlns:p14="http://schemas.microsoft.com/office/powerpoint/2010/main" val="2489351745"/>
       </p:ext>
     </p:extLst>
   </p:cSld>

</xml_diff>

<commit_message>
Correccion en icono: facebook
</commit_message>
<xml_diff>
--- a/icons.pptx
+++ b/icons.pptx
@@ -5900,16 +5900,16 @@
       </p:grpSpPr>
       <p:grpSp>
         <p:nvGrpSpPr>
-          <p:cNvPr id="2" name="1 Grupo"/>
+          <p:cNvPr id="3" name="2 Grupo"/>
           <p:cNvGrpSpPr/>
           <p:nvPr/>
         </p:nvGrpSpPr>
         <p:grpSpPr>
           <a:xfrm>
-            <a:off x="2191182" y="1124744"/>
-            <a:ext cx="3465492" cy="3456384"/>
-            <a:chOff x="2191182" y="1124744"/>
-            <a:chExt cx="3465492" cy="3456384"/>
+            <a:off x="2195736" y="1124744"/>
+            <a:ext cx="3456384" cy="3456384"/>
+            <a:chOff x="2195736" y="1124744"/>
+            <a:chExt cx="3456384" cy="3456384"/>
           </a:xfrm>
         </p:grpSpPr>
         <p:sp>
@@ -5979,8 +5979,8 @@
           </p:blipFill>
           <p:spPr bwMode="auto">
             <a:xfrm>
-              <a:off x="2191182" y="1124744"/>
-              <a:ext cx="3465492" cy="3456384"/>
+              <a:off x="2229463" y="1162924"/>
+              <a:ext cx="3388930" cy="3380023"/>
             </a:xfrm>
             <a:prstGeom prst="rect">
               <a:avLst/>

</xml_diff>